<commit_message>
Update Quarto PPTX template demo
</commit_message>
<xml_diff>
--- a/inst/quarto/ppt_report_demo.pptx
+++ b/inst/quarto/ppt_report_demo.pptx
@@ -4,6 +4,9 @@
   <p:sldMasterIdLst>
     <p:sldMasterId id="2147483648" r:id="rId1"/>
   </p:sldMasterIdLst>
+  <p:notesMasterIdLst>
+    <p:notesMasterId r:id="rId17"/>
+  </p:notesMasterIdLst>
   <p:sldIdLst>
     <p:sldId id="256" r:id="rId2"/>
     <p:sldId id="257" r:id="rId3"/>
@@ -12,6 +15,14 @@
     <p:sldId id="260" r:id="rId6"/>
     <p:sldId id="261" r:id="rId7"/>
     <p:sldId id="262" r:id="rId8"/>
+    <p:sldId id="263" r:id="rId9"/>
+    <p:sldId id="264" r:id="rId10"/>
+    <p:sldId id="265" r:id="rId11"/>
+    <p:sldId id="266" r:id="rId12"/>
+    <p:sldId id="267" r:id="rId13"/>
+    <p:sldId id="268" r:id="rId14"/>
+    <p:sldId id="269" r:id="rId15"/>
+    <p:sldId id="270" r:id="rId16"/>
   </p:sldIdLst>
   <p:sldSz cx="9144000" cy="5143500" type="screen16x9"/>
   <p:notesSz cx="6858000" cy="9144000"/>
@@ -125,8 +136,442 @@
         </p15:guide>
       </p15:sldGuideLst>
     </p:ext>
+    <p:ext uri="{2D200454-40CA-4A62-9FC3-DE9A4176ACB9}">
+      <p15:notesGuideLst xmlns:p15="http://schemas.microsoft.com/office/powerpoint/2012/main"/>
+    </p:ext>
   </p:extLst>
 </p:presentation>
+</file>
+
+<file path=ppt/notesMasters/notesMaster1.xml><?xml version="1.0" encoding="utf-8"?>
+<p:notesMaster xmlns:a="http://schemas.openxmlformats.org/drawingml/2006/main" xmlns:r="http://schemas.openxmlformats.org/officeDocument/2006/relationships" xmlns:p="http://schemas.openxmlformats.org/presentationml/2006/main">
+  <p:cSld>
+    <p:bg>
+      <p:bgRef idx="1001">
+        <a:schemeClr val="bg1"/>
+      </p:bgRef>
+    </p:bg>
+    <p:spTree>
+      <p:nvGrpSpPr>
+        <p:cNvPr id="1" name=""/>
+        <p:cNvGrpSpPr/>
+        <p:nvPr/>
+      </p:nvGrpSpPr>
+      <p:grpSpPr>
+        <a:xfrm>
+          <a:off x="0" y="0"/>
+          <a:ext cx="0" cy="0"/>
+          <a:chOff x="0" y="0"/>
+          <a:chExt cx="0" cy="0"/>
+        </a:xfrm>
+      </p:grpSpPr>
+      <p:sp>
+        <p:nvSpPr>
+          <p:cNvPr id="2" name="Header Placeholder 1"/>
+          <p:cNvSpPr>
+            <a:spLocks noGrp="1"/>
+          </p:cNvSpPr>
+          <p:nvPr>
+            <p:ph type="hdr" sz="quarter"/>
+          </p:nvPr>
+        </p:nvSpPr>
+        <p:spPr>
+          <a:xfrm>
+            <a:off x="0" y="0"/>
+            <a:ext cx="2971800" cy="458788"/>
+          </a:xfrm>
+          <a:prstGeom prst="rect">
+            <a:avLst/>
+          </a:prstGeom>
+        </p:spPr>
+        <p:txBody>
+          <a:bodyPr vert="horz" lIns="91440" tIns="45720" rIns="91440" bIns="45720" rtlCol="0"/>
+          <a:lstStyle>
+            <a:lvl1pPr algn="l">
+              <a:defRPr sz="1200"/>
+            </a:lvl1pPr>
+          </a:lstStyle>
+          <a:p>
+            <a:endParaRPr lang="en-US"/>
+          </a:p>
+        </p:txBody>
+      </p:sp>
+      <p:sp>
+        <p:nvSpPr>
+          <p:cNvPr id="3" name="Date Placeholder 2"/>
+          <p:cNvSpPr>
+            <a:spLocks noGrp="1"/>
+          </p:cNvSpPr>
+          <p:nvPr>
+            <p:ph type="dt" idx="1"/>
+          </p:nvPr>
+        </p:nvSpPr>
+        <p:spPr>
+          <a:xfrm>
+            <a:off x="3884613" y="0"/>
+            <a:ext cx="2971800" cy="458788"/>
+          </a:xfrm>
+          <a:prstGeom prst="rect">
+            <a:avLst/>
+          </a:prstGeom>
+        </p:spPr>
+        <p:txBody>
+          <a:bodyPr vert="horz" lIns="91440" tIns="45720" rIns="91440" bIns="45720" rtlCol="0"/>
+          <a:lstStyle>
+            <a:lvl1pPr algn="r">
+              <a:defRPr sz="1200"/>
+            </a:lvl1pPr>
+          </a:lstStyle>
+          <a:p>
+            <a:fld id="{0F9C1CCF-B725-44A7-AA57-5E433BD85C9F}" type="datetimeFigureOut">
+              <a:rPr lang="en-US" smtClean="0"/>
+              <a:t>1/2/22</a:t>
+            </a:fld>
+            <a:endParaRPr lang="en-US"/>
+          </a:p>
+        </p:txBody>
+      </p:sp>
+      <p:sp>
+        <p:nvSpPr>
+          <p:cNvPr id="4" name="Slide Image Placeholder 3"/>
+          <p:cNvSpPr>
+            <a:spLocks noGrp="1" noRot="1" noChangeAspect="1"/>
+          </p:cNvSpPr>
+          <p:nvPr>
+            <p:ph type="sldImg" idx="2"/>
+          </p:nvPr>
+        </p:nvSpPr>
+        <p:spPr>
+          <a:xfrm>
+            <a:off x="685800" y="1143000"/>
+            <a:ext cx="5486400" cy="3086100"/>
+          </a:xfrm>
+          <a:prstGeom prst="rect">
+            <a:avLst/>
+          </a:prstGeom>
+          <a:noFill/>
+          <a:ln w="12700">
+            <a:solidFill>
+              <a:prstClr val="black"/>
+            </a:solidFill>
+          </a:ln>
+        </p:spPr>
+        <p:txBody>
+          <a:bodyPr vert="horz" lIns="91440" tIns="45720" rIns="91440" bIns="45720" rtlCol="0" anchor="ctr"/>
+          <a:lstStyle/>
+          <a:p>
+            <a:endParaRPr lang="en-US"/>
+          </a:p>
+        </p:txBody>
+      </p:sp>
+      <p:sp>
+        <p:nvSpPr>
+          <p:cNvPr id="5" name="Notes Placeholder 4"/>
+          <p:cNvSpPr>
+            <a:spLocks noGrp="1"/>
+          </p:cNvSpPr>
+          <p:nvPr>
+            <p:ph type="body" sz="quarter" idx="3"/>
+          </p:nvPr>
+        </p:nvSpPr>
+        <p:spPr>
+          <a:xfrm>
+            <a:off x="685800" y="4400550"/>
+            <a:ext cx="5486400" cy="3600450"/>
+          </a:xfrm>
+          <a:prstGeom prst="rect">
+            <a:avLst/>
+          </a:prstGeom>
+        </p:spPr>
+        <p:txBody>
+          <a:bodyPr vert="horz" lIns="91440" tIns="45720" rIns="91440" bIns="45720" rtlCol="0"/>
+          <a:lstStyle/>
+          <a:p>
+            <a:pPr lvl="0"/>
+            <a:r>
+              <a:rPr lang="en-US"/>
+              <a:t>Click to edit Master text styles</a:t>
+            </a:r>
+          </a:p>
+          <a:p>
+            <a:pPr lvl="1"/>
+            <a:r>
+              <a:rPr lang="en-US"/>
+              <a:t>Second level</a:t>
+            </a:r>
+          </a:p>
+          <a:p>
+            <a:pPr lvl="2"/>
+            <a:r>
+              <a:rPr lang="en-US"/>
+              <a:t>Third level</a:t>
+            </a:r>
+          </a:p>
+          <a:p>
+            <a:pPr lvl="3"/>
+            <a:r>
+              <a:rPr lang="en-US"/>
+              <a:t>Fourth level</a:t>
+            </a:r>
+          </a:p>
+          <a:p>
+            <a:pPr lvl="4"/>
+            <a:r>
+              <a:rPr lang="en-US"/>
+              <a:t>Fifth level</a:t>
+            </a:r>
+          </a:p>
+        </p:txBody>
+      </p:sp>
+      <p:sp>
+        <p:nvSpPr>
+          <p:cNvPr id="6" name="Footer Placeholder 5"/>
+          <p:cNvSpPr>
+            <a:spLocks noGrp="1"/>
+          </p:cNvSpPr>
+          <p:nvPr>
+            <p:ph type="ftr" sz="quarter" idx="4"/>
+          </p:nvPr>
+        </p:nvSpPr>
+        <p:spPr>
+          <a:xfrm>
+            <a:off x="0" y="8685213"/>
+            <a:ext cx="2971800" cy="458787"/>
+          </a:xfrm>
+          <a:prstGeom prst="rect">
+            <a:avLst/>
+          </a:prstGeom>
+        </p:spPr>
+        <p:txBody>
+          <a:bodyPr vert="horz" lIns="91440" tIns="45720" rIns="91440" bIns="45720" rtlCol="0" anchor="b"/>
+          <a:lstStyle>
+            <a:lvl1pPr algn="l">
+              <a:defRPr sz="1200"/>
+            </a:lvl1pPr>
+          </a:lstStyle>
+          <a:p>
+            <a:endParaRPr lang="en-US"/>
+          </a:p>
+        </p:txBody>
+      </p:sp>
+      <p:sp>
+        <p:nvSpPr>
+          <p:cNvPr id="7" name="Slide Number Placeholder 6"/>
+          <p:cNvSpPr>
+            <a:spLocks noGrp="1"/>
+          </p:cNvSpPr>
+          <p:nvPr>
+            <p:ph type="sldNum" sz="quarter" idx="5"/>
+          </p:nvPr>
+        </p:nvSpPr>
+        <p:spPr>
+          <a:xfrm>
+            <a:off x="3884613" y="8685213"/>
+            <a:ext cx="2971800" cy="458787"/>
+          </a:xfrm>
+          <a:prstGeom prst="rect">
+            <a:avLst/>
+          </a:prstGeom>
+        </p:spPr>
+        <p:txBody>
+          <a:bodyPr vert="horz" lIns="91440" tIns="45720" rIns="91440" bIns="45720" rtlCol="0" anchor="b"/>
+          <a:lstStyle>
+            <a:lvl1pPr algn="r">
+              <a:defRPr sz="1200"/>
+            </a:lvl1pPr>
+          </a:lstStyle>
+          <a:p>
+            <a:fld id="{18BDFEC3-8487-43E8-A154-7C12CBC1FFF2}" type="slidenum">
+              <a:rPr lang="en-US" smtClean="0"/>
+              <a:t>‹#›</a:t>
+            </a:fld>
+            <a:endParaRPr lang="en-US"/>
+          </a:p>
+        </p:txBody>
+      </p:sp>
+    </p:spTree>
+    <p:extLst>
+      <p:ext uri="{BB962C8B-B14F-4D97-AF65-F5344CB8AC3E}">
+        <p14:creationId xmlns:p14="http://schemas.microsoft.com/office/powerpoint/2010/main" val="3782709779"/>
+      </p:ext>
+    </p:extLst>
+  </p:cSld>
+  <p:clrMap bg1="lt1" tx1="dk1" bg2="lt2" tx2="dk2" accent1="accent1" accent2="accent2" accent3="accent3" accent4="accent4" accent5="accent5" accent6="accent6" hlink="hlink" folHlink="folHlink"/>
+  <p:notesStyle>
+    <a:lvl1pPr marL="0" algn="l" defTabSz="914400" rtl="0" eaLnBrk="1" latinLnBrk="0" hangingPunct="1">
+      <a:defRPr sz="1200" kern="1200">
+        <a:solidFill>
+          <a:schemeClr val="tx1"/>
+        </a:solidFill>
+        <a:latin typeface="+mn-lt"/>
+        <a:ea typeface="+mn-ea"/>
+        <a:cs typeface="+mn-cs"/>
+      </a:defRPr>
+    </a:lvl1pPr>
+    <a:lvl2pPr marL="457200" algn="l" defTabSz="914400" rtl="0" eaLnBrk="1" latinLnBrk="0" hangingPunct="1">
+      <a:defRPr sz="1200" kern="1200">
+        <a:solidFill>
+          <a:schemeClr val="tx1"/>
+        </a:solidFill>
+        <a:latin typeface="+mn-lt"/>
+        <a:ea typeface="+mn-ea"/>
+        <a:cs typeface="+mn-cs"/>
+      </a:defRPr>
+    </a:lvl2pPr>
+    <a:lvl3pPr marL="914400" algn="l" defTabSz="914400" rtl="0" eaLnBrk="1" latinLnBrk="0" hangingPunct="1">
+      <a:defRPr sz="1200" kern="1200">
+        <a:solidFill>
+          <a:schemeClr val="tx1"/>
+        </a:solidFill>
+        <a:latin typeface="+mn-lt"/>
+        <a:ea typeface="+mn-ea"/>
+        <a:cs typeface="+mn-cs"/>
+      </a:defRPr>
+    </a:lvl3pPr>
+    <a:lvl4pPr marL="1371600" algn="l" defTabSz="914400" rtl="0" eaLnBrk="1" latinLnBrk="0" hangingPunct="1">
+      <a:defRPr sz="1200" kern="1200">
+        <a:solidFill>
+          <a:schemeClr val="tx1"/>
+        </a:solidFill>
+        <a:latin typeface="+mn-lt"/>
+        <a:ea typeface="+mn-ea"/>
+        <a:cs typeface="+mn-cs"/>
+      </a:defRPr>
+    </a:lvl4pPr>
+    <a:lvl5pPr marL="1828800" algn="l" defTabSz="914400" rtl="0" eaLnBrk="1" latinLnBrk="0" hangingPunct="1">
+      <a:defRPr sz="1200" kern="1200">
+        <a:solidFill>
+          <a:schemeClr val="tx1"/>
+        </a:solidFill>
+        <a:latin typeface="+mn-lt"/>
+        <a:ea typeface="+mn-ea"/>
+        <a:cs typeface="+mn-cs"/>
+      </a:defRPr>
+    </a:lvl5pPr>
+    <a:lvl6pPr marL="2286000" algn="l" defTabSz="914400" rtl="0" eaLnBrk="1" latinLnBrk="0" hangingPunct="1">
+      <a:defRPr sz="1200" kern="1200">
+        <a:solidFill>
+          <a:schemeClr val="tx1"/>
+        </a:solidFill>
+        <a:latin typeface="+mn-lt"/>
+        <a:ea typeface="+mn-ea"/>
+        <a:cs typeface="+mn-cs"/>
+      </a:defRPr>
+    </a:lvl6pPr>
+    <a:lvl7pPr marL="2743200" algn="l" defTabSz="914400" rtl="0" eaLnBrk="1" latinLnBrk="0" hangingPunct="1">
+      <a:defRPr sz="1200" kern="1200">
+        <a:solidFill>
+          <a:schemeClr val="tx1"/>
+        </a:solidFill>
+        <a:latin typeface="+mn-lt"/>
+        <a:ea typeface="+mn-ea"/>
+        <a:cs typeface="+mn-cs"/>
+      </a:defRPr>
+    </a:lvl7pPr>
+    <a:lvl8pPr marL="3200400" algn="l" defTabSz="914400" rtl="0" eaLnBrk="1" latinLnBrk="0" hangingPunct="1">
+      <a:defRPr sz="1200" kern="1200">
+        <a:solidFill>
+          <a:schemeClr val="tx1"/>
+        </a:solidFill>
+        <a:latin typeface="+mn-lt"/>
+        <a:ea typeface="+mn-ea"/>
+        <a:cs typeface="+mn-cs"/>
+      </a:defRPr>
+    </a:lvl8pPr>
+    <a:lvl9pPr marL="3657600" algn="l" defTabSz="914400" rtl="0" eaLnBrk="1" latinLnBrk="0" hangingPunct="1">
+      <a:defRPr sz="1200" kern="1200">
+        <a:solidFill>
+          <a:schemeClr val="tx1"/>
+        </a:solidFill>
+        <a:latin typeface="+mn-lt"/>
+        <a:ea typeface="+mn-ea"/>
+        <a:cs typeface="+mn-cs"/>
+      </a:defRPr>
+    </a:lvl9pPr>
+  </p:notesStyle>
+</p:notesMaster>
+</file>
+
+<file path=ppt/notesSlides/notesSlide1.xml><?xml version="1.0" encoding="utf-8"?>
+<p:notes xmlns:a="http://schemas.openxmlformats.org/drawingml/2006/main" xmlns:r="http://schemas.openxmlformats.org/officeDocument/2006/relationships" xmlns:p="http://schemas.openxmlformats.org/presentationml/2006/main">
+  <p:cSld>
+    <p:spTree>
+      <p:nvGrpSpPr>
+        <p:cNvPr id="1" name=""/>
+        <p:cNvGrpSpPr/>
+        <p:nvPr/>
+      </p:nvGrpSpPr>
+      <p:grpSpPr>
+        <a:xfrm>
+          <a:off x="0" y="0"/>
+          <a:ext cx="0" cy="0"/>
+          <a:chOff x="0" y="0"/>
+          <a:chExt cx="0" cy="0"/>
+        </a:xfrm>
+      </p:grpSpPr>
+      <p:sp>
+        <p:nvSpPr>
+          <p:cNvPr id="2" name="Slide Image Placeholder 1"/>
+          <p:cNvSpPr>
+            <a:spLocks noGrp="1" noRot="1" noChangeAspect="1"/>
+          </p:cNvSpPr>
+          <p:nvPr>
+            <p:ph type="sldImg"/>
+          </p:nvPr>
+        </p:nvSpPr>
+        <p:spPr/>
+      </p:sp>
+      <p:sp>
+        <p:nvSpPr>
+          <p:cNvPr id="3" name="Notes Placeholder 2"/>
+          <p:cNvSpPr>
+            <a:spLocks noGrp="1"/>
+          </p:cNvSpPr>
+          <p:nvPr>
+            <p:ph type="body" idx="1"/>
+          </p:nvPr>
+        </p:nvSpPr>
+        <p:spPr/>
+        <p:txBody>
+          <a:bodyPr/>
+          <a:lstStyle/>
+          <a:p>
+            <a:pPr lvl="0" indent="0" marL="0">
+              <a:buNone/>
+            </a:pPr>
+            <a:r>
+              <a:rPr/>
+              <a:t>Speaker notes go here.</a:t>
+            </a:r>
+          </a:p>
+        </p:txBody>
+      </p:sp>
+      <p:sp>
+        <p:nvSpPr>
+          <p:cNvPr id="4" name="Slide Number Placeholder 3"/>
+          <p:cNvSpPr>
+            <a:spLocks noGrp="1"/>
+          </p:cNvSpPr>
+          <p:nvPr>
+            <p:ph type="sldNum" sz="quarter" idx="10"/>
+          </p:nvPr>
+        </p:nvSpPr>
+        <p:spPr/>
+        <p:txBody>
+          <a:bodyPr/>
+          <a:lstStyle/>
+          <a:p>
+            <a:fld id="{18BDFEC3-8487-43E8-A154-7C12CBC1FFF2}" type="slidenum">
+              <a:rPr lang="en-US"/>
+              <a:t>10</a:t>
+            </a:fld>
+            <a:endParaRPr lang="en-US"/>
+          </a:p>
+        </p:txBody>
+      </p:sp>
+    </p:spTree>
+  </p:cSld>
+</p:notes>
 </file>
 
 <file path=ppt/slideLayouts/slideLayout1.xml><?xml version="1.0" encoding="utf-8"?>
@@ -477,13 +922,6 @@
   <p:clrMapOvr>
     <a:masterClrMapping/>
   </p:clrMapOvr>
-  <p:timing>
-    <p:tnLst>
-      <p:par>
-        <p:cTn id="1" dur="indefinite" restart="never" nodeType="tmRoot"/>
-      </p:par>
-    </p:tnLst>
-  </p:timing>
 </p:sldLayout>
 </file>
 
@@ -559,39 +997,70 @@
         <p:spPr/>
         <p:txBody>
           <a:bodyPr vert="eaVert"/>
-          <a:lstStyle/>
+          <a:lstStyle>
+            <a:lvl1pPr>
+              <a:defRPr sz="1600">
+                <a:latin typeface="Arial" panose="020B0604020202020204" pitchFamily="34" charset="0"/>
+                <a:cs typeface="Arial" panose="020B0604020202020204" pitchFamily="34" charset="0"/>
+              </a:defRPr>
+            </a:lvl1pPr>
+            <a:lvl2pPr>
+              <a:defRPr sz="1400">
+                <a:latin typeface="Arial" panose="020B0604020202020204" pitchFamily="34" charset="0"/>
+                <a:cs typeface="Arial" panose="020B0604020202020204" pitchFamily="34" charset="0"/>
+              </a:defRPr>
+            </a:lvl2pPr>
+            <a:lvl3pPr>
+              <a:defRPr sz="1200">
+                <a:latin typeface="Arial" panose="020B0604020202020204" pitchFamily="34" charset="0"/>
+                <a:cs typeface="Arial" panose="020B0604020202020204" pitchFamily="34" charset="0"/>
+              </a:defRPr>
+            </a:lvl3pPr>
+            <a:lvl4pPr>
+              <a:defRPr sz="1000">
+                <a:latin typeface="Arial" panose="020B0604020202020204" pitchFamily="34" charset="0"/>
+                <a:cs typeface="Arial" panose="020B0604020202020204" pitchFamily="34" charset="0"/>
+              </a:defRPr>
+            </a:lvl4pPr>
+            <a:lvl5pPr>
+              <a:defRPr sz="900">
+                <a:latin typeface="Arial" panose="020B0604020202020204" pitchFamily="34" charset="0"/>
+                <a:cs typeface="Arial" panose="020B0604020202020204" pitchFamily="34" charset="0"/>
+              </a:defRPr>
+            </a:lvl5pPr>
+          </a:lstStyle>
           <a:p>
             <a:pPr lvl="0"/>
             <a:r>
-              <a:rPr lang="en-US"/>
+              <a:rPr lang="en-US" dirty="0"/>
               <a:t>Click to edit Master text styles</a:t>
             </a:r>
           </a:p>
           <a:p>
             <a:pPr lvl="1"/>
             <a:r>
-              <a:rPr lang="en-US"/>
+              <a:rPr lang="en-US" dirty="0"/>
               <a:t>Second level</a:t>
             </a:r>
           </a:p>
           <a:p>
             <a:pPr lvl="2"/>
             <a:r>
-              <a:rPr lang="en-US"/>
+              <a:rPr lang="en-US" dirty="0"/>
               <a:t>Third level</a:t>
             </a:r>
           </a:p>
           <a:p>
             <a:pPr lvl="3"/>
             <a:r>
-              <a:rPr lang="en-US"/>
+              <a:rPr lang="en-US" dirty="0"/>
               <a:t>Fourth level</a:t>
             </a:r>
           </a:p>
           <a:p>
             <a:pPr lvl="4"/>
             <a:r>
-              <a:rPr lang="en-US"/>
+              <a:rPr lang="en-US" dirty="0"/>
               <a:t>Fifth level</a:t>
             </a:r>
           </a:p>
@@ -862,10 +1331,17 @@
         </p:spPr>
         <p:txBody>
           <a:bodyPr vert="eaVert"/>
-          <a:lstStyle/>
-          <a:p>
-            <a:r>
-              <a:rPr lang="en-US"/>
+          <a:lstStyle>
+            <a:lvl1pPr>
+              <a:defRPr>
+                <a:latin typeface="Arial" panose="020B0604020202020204" pitchFamily="34" charset="0"/>
+                <a:cs typeface="Arial" panose="020B0604020202020204" pitchFamily="34" charset="0"/>
+              </a:defRPr>
+            </a:lvl1pPr>
+          </a:lstStyle>
+          <a:p>
+            <a:r>
+              <a:rPr lang="en-US" dirty="0"/>
               <a:t>Click to edit Master title style</a:t>
             </a:r>
           </a:p>
@@ -889,39 +1365,70 @@
         </p:spPr>
         <p:txBody>
           <a:bodyPr vert="eaVert"/>
-          <a:lstStyle/>
+          <a:lstStyle>
+            <a:lvl1pPr>
+              <a:defRPr>
+                <a:latin typeface="Arial" panose="020B0604020202020204" pitchFamily="34" charset="0"/>
+                <a:cs typeface="Arial" panose="020B0604020202020204" pitchFamily="34" charset="0"/>
+              </a:defRPr>
+            </a:lvl1pPr>
+            <a:lvl2pPr>
+              <a:defRPr>
+                <a:latin typeface="Arial" panose="020B0604020202020204" pitchFamily="34" charset="0"/>
+                <a:cs typeface="Arial" panose="020B0604020202020204" pitchFamily="34" charset="0"/>
+              </a:defRPr>
+            </a:lvl2pPr>
+            <a:lvl3pPr>
+              <a:defRPr>
+                <a:latin typeface="Arial" panose="020B0604020202020204" pitchFamily="34" charset="0"/>
+                <a:cs typeface="Arial" panose="020B0604020202020204" pitchFamily="34" charset="0"/>
+              </a:defRPr>
+            </a:lvl3pPr>
+            <a:lvl4pPr>
+              <a:defRPr>
+                <a:latin typeface="Arial" panose="020B0604020202020204" pitchFamily="34" charset="0"/>
+                <a:cs typeface="Arial" panose="020B0604020202020204" pitchFamily="34" charset="0"/>
+              </a:defRPr>
+            </a:lvl4pPr>
+            <a:lvl5pPr>
+              <a:defRPr>
+                <a:latin typeface="Arial" panose="020B0604020202020204" pitchFamily="34" charset="0"/>
+                <a:cs typeface="Arial" panose="020B0604020202020204" pitchFamily="34" charset="0"/>
+              </a:defRPr>
+            </a:lvl5pPr>
+          </a:lstStyle>
           <a:p>
             <a:pPr lvl="0"/>
             <a:r>
-              <a:rPr lang="en-US"/>
+              <a:rPr lang="en-US" dirty="0"/>
               <a:t>Click to edit Master text styles</a:t>
             </a:r>
           </a:p>
           <a:p>
             <a:pPr lvl="1"/>
             <a:r>
-              <a:rPr lang="en-US"/>
+              <a:rPr lang="en-US" dirty="0"/>
               <a:t>Second level</a:t>
             </a:r>
           </a:p>
           <a:p>
             <a:pPr lvl="2"/>
             <a:r>
-              <a:rPr lang="en-US"/>
+              <a:rPr lang="en-US" dirty="0"/>
               <a:t>Third level</a:t>
             </a:r>
           </a:p>
           <a:p>
             <a:pPr lvl="3"/>
             <a:r>
-              <a:rPr lang="en-US"/>
+              <a:rPr lang="en-US" dirty="0"/>
               <a:t>Fourth level</a:t>
             </a:r>
           </a:p>
           <a:p>
             <a:pPr lvl="4"/>
             <a:r>
-              <a:rPr lang="en-US"/>
+              <a:rPr lang="en-US" dirty="0"/>
               <a:t>Fifth level</a:t>
             </a:r>
           </a:p>
@@ -1229,7 +1736,38 @@
         <p:spPr/>
         <p:txBody>
           <a:bodyPr/>
-          <a:lstStyle/>
+          <a:lstStyle>
+            <a:lvl1pPr>
+              <a:defRPr sz="1600">
+                <a:latin typeface="Arial" panose="020B0604020202020204" pitchFamily="34" charset="0"/>
+                <a:cs typeface="Arial" panose="020B0604020202020204" pitchFamily="34" charset="0"/>
+              </a:defRPr>
+            </a:lvl1pPr>
+            <a:lvl2pPr>
+              <a:defRPr sz="1400">
+                <a:latin typeface="Arial" panose="020B0604020202020204" pitchFamily="34" charset="0"/>
+                <a:cs typeface="Arial" panose="020B0604020202020204" pitchFamily="34" charset="0"/>
+              </a:defRPr>
+            </a:lvl2pPr>
+            <a:lvl3pPr>
+              <a:defRPr sz="1200">
+                <a:latin typeface="Arial" panose="020B0604020202020204" pitchFamily="34" charset="0"/>
+                <a:cs typeface="Arial" panose="020B0604020202020204" pitchFamily="34" charset="0"/>
+              </a:defRPr>
+            </a:lvl3pPr>
+            <a:lvl4pPr>
+              <a:defRPr sz="1000">
+                <a:latin typeface="Arial" panose="020B0604020202020204" pitchFamily="34" charset="0"/>
+                <a:cs typeface="Arial" panose="020B0604020202020204" pitchFamily="34" charset="0"/>
+              </a:defRPr>
+            </a:lvl4pPr>
+            <a:lvl5pPr>
+              <a:defRPr sz="900">
+                <a:latin typeface="Arial" panose="020B0604020202020204" pitchFamily="34" charset="0"/>
+                <a:cs typeface="Arial" panose="020B0604020202020204" pitchFamily="34" charset="0"/>
+              </a:defRPr>
+            </a:lvl5pPr>
+          </a:lstStyle>
           <a:p>
             <a:pPr lvl="0"/>
             <a:r>
@@ -1494,13 +2032,6 @@
   <p:clrMapOvr>
     <a:masterClrMapping/>
   </p:clrMapOvr>
-  <p:timing>
-    <p:tnLst>
-      <p:par>
-        <p:cTn id="1" dur="indefinite" restart="never" nodeType="tmRoot"/>
-      </p:par>
-    </p:tnLst>
-  </p:timing>
 </p:sldLayout>
 </file>
 
@@ -1829,7 +2360,7 @@
                 <a:tabLst/>
                 <a:defRPr/>
               </a:pPr>
-              <a:endParaRPr kumimoji="0" lang="en-US" sz="1800" b="0" i="0" u="none" strike="noStrike" kern="0" cap="none" spc="0" normalizeH="0" baseline="0" noProof="0" dirty="0" smtClean="0">
+              <a:endParaRPr kumimoji="0" lang="en-US" sz="1800" b="0" i="0" u="none" strike="noStrike" kern="0" cap="none" spc="0" normalizeH="0" baseline="0" noProof="0" dirty="0">
                 <a:ln>
                   <a:noFill/>
                 </a:ln>
@@ -2073,7 +2604,7 @@
                 <a:tabLst/>
                 <a:defRPr/>
               </a:pPr>
-              <a:endParaRPr kumimoji="0" lang="en-US" sz="1800" b="0" i="0" u="none" strike="noStrike" kern="0" cap="none" spc="0" normalizeH="0" baseline="0" noProof="0" dirty="0" smtClean="0">
+              <a:endParaRPr kumimoji="0" lang="en-US" sz="1800" b="0" i="0" u="none" strike="noStrike" kern="0" cap="none" spc="0" normalizeH="0" baseline="0" noProof="0" dirty="0">
                 <a:ln>
                   <a:noFill/>
                 </a:ln>
@@ -2267,7 +2798,7 @@
                 <a:tabLst/>
                 <a:defRPr/>
               </a:pPr>
-              <a:endParaRPr kumimoji="0" lang="en-US" sz="1800" b="0" i="0" u="none" strike="noStrike" kern="0" cap="none" spc="0" normalizeH="0" baseline="0" noProof="0" dirty="0" smtClean="0">
+              <a:endParaRPr kumimoji="0" lang="en-US" sz="1800" b="0" i="0" u="none" strike="noStrike" kern="0" cap="none" spc="0" normalizeH="0" baseline="0" noProof="0" dirty="0">
                 <a:ln>
                   <a:noFill/>
                 </a:ln>
@@ -2427,7 +2958,7 @@
                 <a:tabLst/>
                 <a:defRPr/>
               </a:pPr>
-              <a:endParaRPr kumimoji="0" lang="en-US" sz="1800" b="0" i="0" u="none" strike="noStrike" kern="0" cap="none" spc="0" normalizeH="0" baseline="0" noProof="0" dirty="0" smtClean="0">
+              <a:endParaRPr kumimoji="0" lang="en-US" sz="1800" b="0" i="0" u="none" strike="noStrike" kern="0" cap="none" spc="0" normalizeH="0" baseline="0" noProof="0" dirty="0">
                 <a:ln>
                   <a:noFill/>
                 </a:ln>
@@ -2674,13 +3205,6 @@
   <p:clrMapOvr>
     <a:masterClrMapping/>
   </p:clrMapOvr>
-  <p:timing>
-    <p:tnLst>
-      <p:par>
-        <p:cTn id="1" dur="indefinite" restart="never" nodeType="tmRoot"/>
-      </p:par>
-    </p:tnLst>
-  </p:timing>
 </p:sldLayout>
 </file>
 
@@ -2763,19 +3287,34 @@
           <a:bodyPr/>
           <a:lstStyle>
             <a:lvl1pPr>
-              <a:defRPr sz="2100"/>
+              <a:defRPr sz="1600">
+                <a:latin typeface="Arial" panose="020B0604020202020204" pitchFamily="34" charset="0"/>
+                <a:cs typeface="Arial" panose="020B0604020202020204" pitchFamily="34" charset="0"/>
+              </a:defRPr>
             </a:lvl1pPr>
             <a:lvl2pPr>
-              <a:defRPr sz="1800"/>
+              <a:defRPr sz="1400">
+                <a:latin typeface="Arial" panose="020B0604020202020204" pitchFamily="34" charset="0"/>
+                <a:cs typeface="Arial" panose="020B0604020202020204" pitchFamily="34" charset="0"/>
+              </a:defRPr>
             </a:lvl2pPr>
             <a:lvl3pPr>
-              <a:defRPr sz="1500"/>
+              <a:defRPr sz="1200">
+                <a:latin typeface="Arial" panose="020B0604020202020204" pitchFamily="34" charset="0"/>
+                <a:cs typeface="Arial" panose="020B0604020202020204" pitchFamily="34" charset="0"/>
+              </a:defRPr>
             </a:lvl3pPr>
             <a:lvl4pPr>
-              <a:defRPr sz="1350"/>
+              <a:defRPr sz="1000">
+                <a:latin typeface="Arial" panose="020B0604020202020204" pitchFamily="34" charset="0"/>
+                <a:cs typeface="Arial" panose="020B0604020202020204" pitchFamily="34" charset="0"/>
+              </a:defRPr>
             </a:lvl4pPr>
             <a:lvl5pPr>
-              <a:defRPr sz="1350"/>
+              <a:defRPr sz="900">
+                <a:latin typeface="Arial" panose="020B0604020202020204" pitchFamily="34" charset="0"/>
+                <a:cs typeface="Arial" panose="020B0604020202020204" pitchFamily="34" charset="0"/>
+              </a:defRPr>
             </a:lvl5pPr>
             <a:lvl6pPr>
               <a:defRPr sz="1350"/>
@@ -2793,35 +3332,35 @@
           <a:p>
             <a:pPr lvl="0"/>
             <a:r>
-              <a:rPr lang="en-US"/>
+              <a:rPr lang="en-US" dirty="0"/>
               <a:t>Click to edit Master text styles</a:t>
             </a:r>
           </a:p>
           <a:p>
             <a:pPr lvl="1"/>
             <a:r>
-              <a:rPr lang="en-US"/>
+              <a:rPr lang="en-US" dirty="0"/>
               <a:t>Second level</a:t>
             </a:r>
           </a:p>
           <a:p>
             <a:pPr lvl="2"/>
             <a:r>
-              <a:rPr lang="en-US"/>
+              <a:rPr lang="en-US" dirty="0"/>
               <a:t>Third level</a:t>
             </a:r>
           </a:p>
           <a:p>
             <a:pPr lvl="3"/>
             <a:r>
-              <a:rPr lang="en-US"/>
+              <a:rPr lang="en-US" dirty="0"/>
               <a:t>Fourth level</a:t>
             </a:r>
           </a:p>
           <a:p>
             <a:pPr lvl="4"/>
             <a:r>
-              <a:rPr lang="en-US"/>
+              <a:rPr lang="en-US" dirty="0"/>
               <a:t>Fifth level</a:t>
             </a:r>
           </a:p>
@@ -2847,19 +3386,34 @@
           <a:bodyPr/>
           <a:lstStyle>
             <a:lvl1pPr>
-              <a:defRPr sz="2100"/>
+              <a:defRPr sz="1600">
+                <a:latin typeface="Arial" panose="020B0604020202020204" pitchFamily="34" charset="0"/>
+                <a:cs typeface="Arial" panose="020B0604020202020204" pitchFamily="34" charset="0"/>
+              </a:defRPr>
             </a:lvl1pPr>
             <a:lvl2pPr>
-              <a:defRPr sz="1800"/>
+              <a:defRPr sz="1400">
+                <a:latin typeface="Arial" panose="020B0604020202020204" pitchFamily="34" charset="0"/>
+                <a:cs typeface="Arial" panose="020B0604020202020204" pitchFamily="34" charset="0"/>
+              </a:defRPr>
             </a:lvl2pPr>
             <a:lvl3pPr>
-              <a:defRPr sz="1500"/>
+              <a:defRPr sz="1200">
+                <a:latin typeface="Arial" panose="020B0604020202020204" pitchFamily="34" charset="0"/>
+                <a:cs typeface="Arial" panose="020B0604020202020204" pitchFamily="34" charset="0"/>
+              </a:defRPr>
             </a:lvl3pPr>
             <a:lvl4pPr>
-              <a:defRPr sz="1350"/>
+              <a:defRPr sz="1000">
+                <a:latin typeface="Arial" panose="020B0604020202020204" pitchFamily="34" charset="0"/>
+                <a:cs typeface="Arial" panose="020B0604020202020204" pitchFamily="34" charset="0"/>
+              </a:defRPr>
             </a:lvl4pPr>
             <a:lvl5pPr>
-              <a:defRPr sz="1350"/>
+              <a:defRPr sz="900">
+                <a:latin typeface="Arial" panose="020B0604020202020204" pitchFamily="34" charset="0"/>
+                <a:cs typeface="Arial" panose="020B0604020202020204" pitchFamily="34" charset="0"/>
+              </a:defRPr>
             </a:lvl5pPr>
             <a:lvl6pPr>
               <a:defRPr sz="1350"/>
@@ -2877,35 +3431,35 @@
           <a:p>
             <a:pPr lvl="0"/>
             <a:r>
-              <a:rPr lang="en-US"/>
+              <a:rPr lang="en-US" dirty="0"/>
               <a:t>Click to edit Master text styles</a:t>
             </a:r>
           </a:p>
           <a:p>
             <a:pPr lvl="1"/>
             <a:r>
-              <a:rPr lang="en-US"/>
+              <a:rPr lang="en-US" dirty="0"/>
               <a:t>Second level</a:t>
             </a:r>
           </a:p>
           <a:p>
             <a:pPr lvl="2"/>
             <a:r>
-              <a:rPr lang="en-US"/>
+              <a:rPr lang="en-US" dirty="0"/>
               <a:t>Third level</a:t>
             </a:r>
           </a:p>
           <a:p>
             <a:pPr lvl="3"/>
             <a:r>
-              <a:rPr lang="en-US"/>
+              <a:rPr lang="en-US" dirty="0"/>
               <a:t>Fourth level</a:t>
             </a:r>
           </a:p>
           <a:p>
             <a:pPr lvl="4"/>
             <a:r>
-              <a:rPr lang="en-US"/>
+              <a:rPr lang="en-US" dirty="0"/>
               <a:t>Fifth level</a:t>
             </a:r>
           </a:p>
@@ -3165,13 +3719,6 @@
   <p:clrMapOvr>
     <a:masterClrMapping/>
   </p:clrMapOvr>
-  <p:timing>
-    <p:tnLst>
-      <p:par>
-        <p:cTn id="1" dur="indefinite" restart="never" nodeType="tmRoot"/>
-      </p:par>
-    </p:tnLst>
-  </p:timing>
 </p:sldLayout>
 </file>
 
@@ -3255,7 +3802,10 @@
           <a:lstStyle>
             <a:lvl1pPr marL="0" indent="0">
               <a:buNone/>
-              <a:defRPr sz="1800" b="1"/>
+              <a:defRPr sz="1800" b="1">
+                <a:latin typeface="Arial" panose="020B0604020202020204" pitchFamily="34" charset="0"/>
+                <a:cs typeface="Arial" panose="020B0604020202020204" pitchFamily="34" charset="0"/>
+              </a:defRPr>
             </a:lvl1pPr>
             <a:lvl2pPr marL="342900" indent="0">
               <a:buNone/>
@@ -3293,7 +3843,7 @@
           <a:p>
             <a:pPr lvl="0"/>
             <a:r>
-              <a:rPr lang="en-US"/>
+              <a:rPr lang="en-US" dirty="0"/>
               <a:t>Click to edit Master text styles</a:t>
             </a:r>
           </a:p>
@@ -3319,19 +3869,34 @@
           <a:bodyPr/>
           <a:lstStyle>
             <a:lvl1pPr>
-              <a:defRPr sz="1800"/>
+              <a:defRPr sz="1600">
+                <a:latin typeface="Arial" panose="020B0604020202020204" pitchFamily="34" charset="0"/>
+                <a:cs typeface="Arial" panose="020B0604020202020204" pitchFamily="34" charset="0"/>
+              </a:defRPr>
             </a:lvl1pPr>
             <a:lvl2pPr>
-              <a:defRPr sz="1500"/>
+              <a:defRPr sz="1400">
+                <a:latin typeface="Arial" panose="020B0604020202020204" pitchFamily="34" charset="0"/>
+                <a:cs typeface="Arial" panose="020B0604020202020204" pitchFamily="34" charset="0"/>
+              </a:defRPr>
             </a:lvl2pPr>
             <a:lvl3pPr>
-              <a:defRPr sz="1350"/>
+              <a:defRPr sz="1200">
+                <a:latin typeface="Arial" panose="020B0604020202020204" pitchFamily="34" charset="0"/>
+                <a:cs typeface="Arial" panose="020B0604020202020204" pitchFamily="34" charset="0"/>
+              </a:defRPr>
             </a:lvl3pPr>
             <a:lvl4pPr>
-              <a:defRPr sz="1200"/>
+              <a:defRPr sz="1000">
+                <a:latin typeface="Arial" panose="020B0604020202020204" pitchFamily="34" charset="0"/>
+                <a:cs typeface="Arial" panose="020B0604020202020204" pitchFamily="34" charset="0"/>
+              </a:defRPr>
             </a:lvl4pPr>
             <a:lvl5pPr>
-              <a:defRPr sz="1200"/>
+              <a:defRPr sz="900">
+                <a:latin typeface="Arial" panose="020B0604020202020204" pitchFamily="34" charset="0"/>
+                <a:cs typeface="Arial" panose="020B0604020202020204" pitchFamily="34" charset="0"/>
+              </a:defRPr>
             </a:lvl5pPr>
             <a:lvl6pPr>
               <a:defRPr sz="1200"/>
@@ -3349,35 +3914,35 @@
           <a:p>
             <a:pPr lvl="0"/>
             <a:r>
-              <a:rPr lang="en-US"/>
+              <a:rPr lang="en-US" dirty="0"/>
               <a:t>Click to edit Master text styles</a:t>
             </a:r>
           </a:p>
           <a:p>
             <a:pPr lvl="1"/>
             <a:r>
-              <a:rPr lang="en-US"/>
+              <a:rPr lang="en-US" dirty="0"/>
               <a:t>Second level</a:t>
             </a:r>
           </a:p>
           <a:p>
             <a:pPr lvl="2"/>
             <a:r>
-              <a:rPr lang="en-US"/>
+              <a:rPr lang="en-US" dirty="0"/>
               <a:t>Third level</a:t>
             </a:r>
           </a:p>
           <a:p>
             <a:pPr lvl="3"/>
             <a:r>
-              <a:rPr lang="en-US"/>
+              <a:rPr lang="en-US" dirty="0"/>
               <a:t>Fourth level</a:t>
             </a:r>
           </a:p>
           <a:p>
             <a:pPr lvl="4"/>
             <a:r>
-              <a:rPr lang="en-US"/>
+              <a:rPr lang="en-US" dirty="0"/>
               <a:t>Fifth level</a:t>
             </a:r>
           </a:p>
@@ -3404,7 +3969,10 @@
           <a:lstStyle>
             <a:lvl1pPr marL="0" indent="0">
               <a:buNone/>
-              <a:defRPr sz="1800" b="1"/>
+              <a:defRPr sz="1800" b="1">
+                <a:latin typeface="Arial" panose="020B0604020202020204" pitchFamily="34" charset="0"/>
+                <a:cs typeface="Arial" panose="020B0604020202020204" pitchFamily="34" charset="0"/>
+              </a:defRPr>
             </a:lvl1pPr>
             <a:lvl2pPr marL="342900" indent="0">
               <a:buNone/>
@@ -3442,7 +4010,7 @@
           <a:p>
             <a:pPr lvl="0"/>
             <a:r>
-              <a:rPr lang="en-US"/>
+              <a:rPr lang="en-US" dirty="0"/>
               <a:t>Click to edit Master text styles</a:t>
             </a:r>
           </a:p>
@@ -3468,19 +4036,34 @@
           <a:bodyPr/>
           <a:lstStyle>
             <a:lvl1pPr>
-              <a:defRPr sz="1800"/>
+              <a:defRPr sz="1600">
+                <a:latin typeface="Arial" panose="020B0604020202020204" pitchFamily="34" charset="0"/>
+                <a:cs typeface="Arial" panose="020B0604020202020204" pitchFamily="34" charset="0"/>
+              </a:defRPr>
             </a:lvl1pPr>
             <a:lvl2pPr>
-              <a:defRPr sz="1500"/>
+              <a:defRPr sz="1400">
+                <a:latin typeface="Arial" panose="020B0604020202020204" pitchFamily="34" charset="0"/>
+                <a:cs typeface="Arial" panose="020B0604020202020204" pitchFamily="34" charset="0"/>
+              </a:defRPr>
             </a:lvl2pPr>
             <a:lvl3pPr>
-              <a:defRPr sz="1350"/>
+              <a:defRPr sz="1200">
+                <a:latin typeface="Arial" panose="020B0604020202020204" pitchFamily="34" charset="0"/>
+                <a:cs typeface="Arial" panose="020B0604020202020204" pitchFamily="34" charset="0"/>
+              </a:defRPr>
             </a:lvl3pPr>
             <a:lvl4pPr>
-              <a:defRPr sz="1200"/>
+              <a:defRPr sz="1000">
+                <a:latin typeface="Arial" panose="020B0604020202020204" pitchFamily="34" charset="0"/>
+                <a:cs typeface="Arial" panose="020B0604020202020204" pitchFamily="34" charset="0"/>
+              </a:defRPr>
             </a:lvl4pPr>
             <a:lvl5pPr>
-              <a:defRPr sz="1200"/>
+              <a:defRPr sz="900">
+                <a:latin typeface="Arial" panose="020B0604020202020204" pitchFamily="34" charset="0"/>
+                <a:cs typeface="Arial" panose="020B0604020202020204" pitchFamily="34" charset="0"/>
+              </a:defRPr>
             </a:lvl5pPr>
             <a:lvl6pPr>
               <a:defRPr sz="1200"/>
@@ -3498,35 +4081,35 @@
           <a:p>
             <a:pPr lvl="0"/>
             <a:r>
-              <a:rPr lang="en-US"/>
+              <a:rPr lang="en-US" dirty="0"/>
               <a:t>Click to edit Master text styles</a:t>
             </a:r>
           </a:p>
           <a:p>
             <a:pPr lvl="1"/>
             <a:r>
-              <a:rPr lang="en-US"/>
+              <a:rPr lang="en-US" dirty="0"/>
               <a:t>Second level</a:t>
             </a:r>
           </a:p>
           <a:p>
             <a:pPr lvl="2"/>
             <a:r>
-              <a:rPr lang="en-US"/>
+              <a:rPr lang="en-US" dirty="0"/>
               <a:t>Third level</a:t>
             </a:r>
           </a:p>
           <a:p>
             <a:pPr lvl="3"/>
             <a:r>
-              <a:rPr lang="en-US"/>
+              <a:rPr lang="en-US" dirty="0"/>
               <a:t>Fourth level</a:t>
             </a:r>
           </a:p>
           <a:p>
             <a:pPr lvl="4"/>
             <a:r>
-              <a:rPr lang="en-US"/>
+              <a:rPr lang="en-US" dirty="0"/>
               <a:t>Fifth level</a:t>
             </a:r>
           </a:p>
@@ -4421,19 +5004,34 @@
           <a:bodyPr/>
           <a:lstStyle>
             <a:lvl1pPr>
-              <a:defRPr sz="2400"/>
+              <a:defRPr sz="1600">
+                <a:latin typeface="Arial" panose="020B0604020202020204" pitchFamily="34" charset="0"/>
+                <a:cs typeface="Arial" panose="020B0604020202020204" pitchFamily="34" charset="0"/>
+              </a:defRPr>
             </a:lvl1pPr>
             <a:lvl2pPr>
-              <a:defRPr sz="2100"/>
+              <a:defRPr sz="1400">
+                <a:latin typeface="Arial" panose="020B0604020202020204" pitchFamily="34" charset="0"/>
+                <a:cs typeface="Arial" panose="020B0604020202020204" pitchFamily="34" charset="0"/>
+              </a:defRPr>
             </a:lvl2pPr>
             <a:lvl3pPr>
-              <a:defRPr sz="1800"/>
+              <a:defRPr sz="1200">
+                <a:latin typeface="Arial" panose="020B0604020202020204" pitchFamily="34" charset="0"/>
+                <a:cs typeface="Arial" panose="020B0604020202020204" pitchFamily="34" charset="0"/>
+              </a:defRPr>
             </a:lvl3pPr>
             <a:lvl4pPr>
-              <a:defRPr sz="1500"/>
+              <a:defRPr sz="1000">
+                <a:latin typeface="Arial" panose="020B0604020202020204" pitchFamily="34" charset="0"/>
+                <a:cs typeface="Arial" panose="020B0604020202020204" pitchFamily="34" charset="0"/>
+              </a:defRPr>
             </a:lvl4pPr>
             <a:lvl5pPr>
-              <a:defRPr sz="1500"/>
+              <a:defRPr sz="900">
+                <a:latin typeface="Arial" panose="020B0604020202020204" pitchFamily="34" charset="0"/>
+                <a:cs typeface="Arial" panose="020B0604020202020204" pitchFamily="34" charset="0"/>
+              </a:defRPr>
             </a:lvl5pPr>
             <a:lvl6pPr>
               <a:defRPr sz="1500"/>
@@ -4506,7 +5104,10 @@
           <a:lstStyle>
             <a:lvl1pPr marL="0" indent="0">
               <a:buNone/>
-              <a:defRPr sz="1050"/>
+              <a:defRPr sz="1050">
+                <a:latin typeface="Arial" panose="020B0604020202020204" pitchFamily="34" charset="0"/>
+                <a:cs typeface="Arial" panose="020B0604020202020204" pitchFamily="34" charset="0"/>
+              </a:defRPr>
             </a:lvl1pPr>
             <a:lvl2pPr marL="342900" indent="0">
               <a:buNone/>
@@ -4864,12 +5465,15 @@
           <a:bodyPr anchor="b"/>
           <a:lstStyle>
             <a:lvl1pPr algn="l">
-              <a:defRPr sz="1500" b="1"/>
+              <a:defRPr sz="1500" b="1">
+                <a:latin typeface="Arial" panose="020B0604020202020204" pitchFamily="34" charset="0"/>
+                <a:cs typeface="Arial" panose="020B0604020202020204" pitchFamily="34" charset="0"/>
+              </a:defRPr>
             </a:lvl1pPr>
           </a:lstStyle>
           <a:p>
             <a:r>
-              <a:rPr lang="en-US"/>
+              <a:rPr lang="en-US" dirty="0"/>
               <a:t>Click to edit Master title style</a:t>
             </a:r>
           </a:p>
@@ -4896,7 +5500,10 @@
           <a:lstStyle>
             <a:lvl1pPr marL="0" indent="0">
               <a:buNone/>
-              <a:defRPr sz="2400"/>
+              <a:defRPr sz="2400">
+                <a:latin typeface="Arial" panose="020B0604020202020204" pitchFamily="34" charset="0"/>
+                <a:cs typeface="Arial" panose="020B0604020202020204" pitchFamily="34" charset="0"/>
+              </a:defRPr>
             </a:lvl1pPr>
             <a:lvl2pPr marL="342900" indent="0">
               <a:buNone/>
@@ -4932,7 +5539,7 @@
             </a:lvl9pPr>
           </a:lstStyle>
           <a:p>
-            <a:endParaRPr lang="en-US"/>
+            <a:endParaRPr lang="en-US" dirty="0"/>
           </a:p>
         </p:txBody>
       </p:sp>
@@ -4957,7 +5564,10 @@
           <a:lstStyle>
             <a:lvl1pPr marL="0" indent="0">
               <a:buNone/>
-              <a:defRPr sz="1050"/>
+              <a:defRPr sz="1050">
+                <a:latin typeface="Arial" panose="020B0604020202020204" pitchFamily="34" charset="0"/>
+                <a:cs typeface="Arial" panose="020B0604020202020204" pitchFamily="34" charset="0"/>
+              </a:defRPr>
             </a:lvl1pPr>
             <a:lvl2pPr marL="342900" indent="0">
               <a:buNone/>
@@ -4995,7 +5605,7 @@
           <a:p>
             <a:pPr lvl="0"/>
             <a:r>
-              <a:rPr lang="en-US"/>
+              <a:rPr lang="en-US" dirty="0"/>
               <a:t>Click to edit Master text styles</a:t>
             </a:r>
           </a:p>
@@ -5279,7 +5889,7 @@
           <a:lstStyle/>
           <a:p>
             <a:r>
-              <a:rPr b="0" baseline="0" cap="none" dirty="0" i="0" kern="1200" kumimoji="0" lang="en-US" noProof="0" normalizeH="0" smtClean="0" spc="0" strike="noStrike" sz="2400" u="none">
+              <a:rPr b="0" baseline="0" cap="none" dirty="0" i="0" kern="1200" kumimoji="0" lang="en-US" noProof="0" normalizeH="0" spc="0" strike="noStrike" sz="2400" u="none">
                 <a:ln>
                   <a:noFill/>
                 </a:ln>
@@ -5346,7 +5956,7 @@
               <a:defRPr/>
             </a:pPr>
             <a:r>
-              <a:rPr b="0" baseline="0" cap="none" dirty="0" i="0" kern="1200" kumimoji="0" lang="en-US" noProof="0" normalizeH="0" smtClean="0" spc="0" strike="noStrike" sz="1800" u="none">
+              <a:rPr b="0" baseline="0" cap="none" dirty="0" i="0" kern="1200" kumimoji="0" lang="en-US" noProof="0" normalizeH="0" spc="0" strike="noStrike" sz="1800" u="none">
                 <a:ln>
                   <a:noFill/>
                 </a:ln>
@@ -5384,7 +5994,7 @@
               <a:defRPr/>
             </a:pPr>
             <a:r>
-              <a:rPr b="0" baseline="0" cap="none" dirty="0" i="0" kern="1200" kumimoji="0" lang="en-US" noProof="0" normalizeH="0" smtClean="0" spc="0" strike="noStrike" sz="1600" u="none">
+              <a:rPr b="0" baseline="0" cap="none" dirty="0" i="0" kern="1200" kumimoji="0" lang="en-US" noProof="0" normalizeH="0" spc="0" strike="noStrike" sz="1600" u="none">
                 <a:ln>
                   <a:noFill/>
                 </a:ln>
@@ -5422,7 +6032,7 @@
               <a:defRPr/>
             </a:pPr>
             <a:r>
-              <a:rPr b="0" baseline="0" cap="none" dirty="0" i="0" kern="1200" kumimoji="0" lang="en-US" noProof="0" normalizeH="0" smtClean="0" spc="0" strike="noStrike" sz="1600" u="none">
+              <a:rPr b="0" baseline="0" cap="none" dirty="0" i="0" kern="1200" kumimoji="0" lang="en-US" noProof="0" normalizeH="0" spc="0" strike="noStrike" sz="1600" u="none">
                 <a:ln>
                   <a:noFill/>
                 </a:ln>
@@ -5438,20 +6048,6 @@
               </a:rPr>
               <a:t>Third level</a:t>
             </a:r>
-            <a:endParaRPr b="0" baseline="0" cap="none" dirty="0" i="0" kern="1200" kumimoji="0" lang="en-US" noProof="0" normalizeH="0" spc="0" strike="noStrike" sz="1600" u="none">
-              <a:ln>
-                <a:noFill/>
-              </a:ln>
-              <a:solidFill>
-                <a:srgbClr val="000000"/>
-              </a:solidFill>
-              <a:effectLst/>
-              <a:uLnTx/>
-              <a:uFillTx/>
-              <a:latin charset="0" panose="020B0604020202020204" pitchFamily="34" typeface="Arial"/>
-              <a:ea typeface="+mn-ea"/>
-              <a:cs typeface="+mn-cs"/>
-            </a:endParaRPr>
           </a:p>
         </p:txBody>
       </p:sp>
@@ -5513,13 +6109,6 @@
     <p:sldLayoutId id="2147483658" r:id="rId10"/>
     <p:sldLayoutId id="2147483659" r:id="rId11"/>
   </p:sldLayoutIdLst>
-  <p:timing>
-    <p:tnLst>
-      <p:par>
-        <p:cTn dur="indefinite" id="1" nodeType="tmRoot" restart="never"/>
-      </p:par>
-    </p:tnLst>
-  </p:timing>
   <p:hf dt="0" hdr="0"/>
   <p:txStyles>
     <p:titleStyle>
@@ -5895,7 +6484,7 @@
 </p:sld>
 </file>
 
-<file path=ppt/slides/slide2.xml><?xml version="1.0" encoding="utf-8"?>
+<file path=ppt/slides/slide10.xml><?xml version="1.0" encoding="utf-8"?>
 <p:sld xmlns:a="http://schemas.openxmlformats.org/drawingml/2006/main" xmlns:r="http://schemas.openxmlformats.org/officeDocument/2006/relationships" xmlns:p="http://schemas.openxmlformats.org/presentationml/2006/main">
   <p:cSld>
     <p:spTree>
@@ -5922,12 +6511,7 @@
             <p:ph type="title"/>
           </p:nvPr>
         </p:nvSpPr>
-        <p:spPr>
-          <a:xfrm>
-            <a:off x="3851920" y="2704935"/>
-            <a:ext cx="4790598" cy="874927"/>
-          </a:xfrm>
-        </p:spPr>
+        <p:spPr/>
         <p:txBody>
           <a:bodyPr/>
           <a:lstStyle/>
@@ -5937,8 +6521,52 @@
             </a:pPr>
             <a:r>
               <a:rPr/>
-              <a:t>Introduction to Quarto</a:t>
-            </a:r>
+              <a:t>Slide with Speaker Notes</a:t>
+            </a:r>
+          </a:p>
+        </p:txBody>
+      </p:sp>
+      <p:sp>
+        <p:nvSpPr>
+          <p:cNvPr id="3" name="Content Placeholder 2"/>
+          <p:cNvSpPr>
+            <a:spLocks noGrp="1"/>
+          </p:cNvSpPr>
+          <p:nvPr>
+            <p:ph idx="1"/>
+          </p:nvPr>
+        </p:nvSpPr>
+        <p:spPr/>
+        <p:txBody>
+          <a:bodyPr/>
+          <a:lstStyle/>
+          <a:p>
+            <a:pPr lvl="0" indent="0" marL="0">
+              <a:buNone/>
+            </a:pPr>
+            <a:r>
+              <a:rPr/>
+              <a:t>Put your content here. Put your content here.</a:t>
+            </a:r>
+          </a:p>
+        </p:txBody>
+      </p:sp>
+      <p:sp>
+        <p:nvSpPr>
+          <p:cNvPr id="5" name="Footer Placeholder 4"/>
+          <p:cNvSpPr>
+            <a:spLocks noGrp="1"/>
+          </p:cNvSpPr>
+          <p:nvPr>
+            <p:ph idx="11" sz="quarter" type="ftr"/>
+          </p:nvPr>
+        </p:nvSpPr>
+        <p:spPr/>
+        <p:txBody>
+          <a:bodyPr/>
+          <a:lstStyle/>
+          <a:p>
+            <a:endParaRPr lang="en-US"/>
           </a:p>
         </p:txBody>
       </p:sp>
@@ -5947,7 +6575,7 @@
 </p:sld>
 </file>
 
-<file path=ppt/slides/slide3.xml><?xml version="1.0" encoding="utf-8"?>
+<file path=ppt/slides/slide11.xml><?xml version="1.0" encoding="utf-8"?>
 <p:sld xmlns:a="http://schemas.openxmlformats.org/drawingml/2006/main" xmlns:r="http://schemas.openxmlformats.org/officeDocument/2006/relationships" xmlns:p="http://schemas.openxmlformats.org/presentationml/2006/main">
   <p:cSld>
     <p:spTree>
@@ -5974,220 +6602,6 @@
             <p:ph type="title"/>
           </p:nvPr>
         </p:nvSpPr>
-        <p:spPr/>
-        <p:txBody>
-          <a:bodyPr/>
-          <a:lstStyle/>
-          <a:p>
-            <a:pPr lvl="0" indent="0" marL="0">
-              <a:buNone/>
-            </a:pPr>
-            <a:r>
-              <a:rPr/>
-              <a:t>Quarto</a:t>
-            </a:r>
-          </a:p>
-        </p:txBody>
-      </p:sp>
-      <p:sp>
-        <p:nvSpPr>
-          <p:cNvPr id="3" name="Content Placeholder 2"/>
-          <p:cNvSpPr>
-            <a:spLocks noGrp="1"/>
-          </p:cNvSpPr>
-          <p:nvPr>
-            <p:ph idx="1"/>
-          </p:nvPr>
-        </p:nvSpPr>
-        <p:spPr/>
-        <p:txBody>
-          <a:bodyPr/>
-          <a:lstStyle/>
-          <a:p>
-            <a:pPr lvl="0" indent="0" marL="0">
-              <a:buNone/>
-            </a:pPr>
-            <a:r>
-              <a:rPr/>
-              <a:t>Quarto enables you to weave together content and executable code into a finished presentation. To learn more about Quarto presentations see </a:t>
-            </a:r>
-            <a:r>
-              <a:rPr>
-                <a:hlinkClick r:id="rId2"/>
-              </a:rPr>
-              <a:t>https://quarto.org/docs/presentations/</a:t>
-            </a:r>
-            <a:r>
-              <a:rPr/>
-              <a:t>.</a:t>
-            </a:r>
-          </a:p>
-        </p:txBody>
-      </p:sp>
-      <p:sp>
-        <p:nvSpPr>
-          <p:cNvPr id="5" name="Footer Placeholder 4"/>
-          <p:cNvSpPr>
-            <a:spLocks noGrp="1"/>
-          </p:cNvSpPr>
-          <p:nvPr>
-            <p:ph idx="11" sz="quarter" type="ftr"/>
-          </p:nvPr>
-        </p:nvSpPr>
-        <p:spPr/>
-        <p:txBody>
-          <a:bodyPr/>
-          <a:lstStyle/>
-          <a:p>
-            <a:endParaRPr lang="en-US"/>
-          </a:p>
-        </p:txBody>
-      </p:sp>
-    </p:spTree>
-  </p:cSld>
-</p:sld>
-</file>
-
-<file path=ppt/slides/slide4.xml><?xml version="1.0" encoding="utf-8"?>
-<p:sld xmlns:a="http://schemas.openxmlformats.org/drawingml/2006/main" xmlns:r="http://schemas.openxmlformats.org/officeDocument/2006/relationships" xmlns:p="http://schemas.openxmlformats.org/presentationml/2006/main">
-  <p:cSld>
-    <p:spTree>
-      <p:nvGrpSpPr>
-        <p:cNvPr id="1" name=""/>
-        <p:cNvGrpSpPr/>
-        <p:nvPr/>
-      </p:nvGrpSpPr>
-      <p:grpSpPr>
-        <a:xfrm>
-          <a:off x="0" y="0"/>
-          <a:ext cx="0" cy="0"/>
-          <a:chOff x="0" y="0"/>
-          <a:chExt cx="0" cy="0"/>
-        </a:xfrm>
-      </p:grpSpPr>
-      <p:sp>
-        <p:nvSpPr>
-          <p:cNvPr id="2" name="Title 1"/>
-          <p:cNvSpPr>
-            <a:spLocks noGrp="1"/>
-          </p:cNvSpPr>
-          <p:nvPr>
-            <p:ph type="title"/>
-          </p:nvPr>
-        </p:nvSpPr>
-        <p:spPr/>
-        <p:txBody>
-          <a:bodyPr/>
-          <a:lstStyle/>
-          <a:p>
-            <a:pPr lvl="0" indent="0" marL="0">
-              <a:buNone/>
-            </a:pPr>
-            <a:r>
-              <a:rPr/>
-              <a:t>Bullets</a:t>
-            </a:r>
-          </a:p>
-        </p:txBody>
-      </p:sp>
-      <p:sp>
-        <p:nvSpPr>
-          <p:cNvPr id="3" name="Content Placeholder 2"/>
-          <p:cNvSpPr>
-            <a:spLocks noGrp="1"/>
-          </p:cNvSpPr>
-          <p:nvPr>
-            <p:ph idx="1"/>
-          </p:nvPr>
-        </p:nvSpPr>
-        <p:spPr/>
-        <p:txBody>
-          <a:bodyPr/>
-          <a:lstStyle/>
-          <a:p>
-            <a:pPr lvl="0" indent="0" marL="0">
-              <a:buNone/>
-            </a:pPr>
-            <a:r>
-              <a:rPr/>
-              <a:t>When you click the </a:t>
-            </a:r>
-            <a:r>
-              <a:rPr b="1"/>
-              <a:t>Render</a:t>
-            </a:r>
-            <a:r>
-              <a:rPr/>
-              <a:t> button a document will be generated that includes:</a:t>
-            </a:r>
-          </a:p>
-          <a:p>
-            <a:pPr lvl="0"/>
-            <a:r>
-              <a:rPr/>
-              <a:t>Content authored with markdown</a:t>
-            </a:r>
-          </a:p>
-          <a:p>
-            <a:pPr lvl="0"/>
-            <a:r>
-              <a:rPr/>
-              <a:t>Output from executable code</a:t>
-            </a:r>
-          </a:p>
-        </p:txBody>
-      </p:sp>
-      <p:sp>
-        <p:nvSpPr>
-          <p:cNvPr id="5" name="Footer Placeholder 4"/>
-          <p:cNvSpPr>
-            <a:spLocks noGrp="1"/>
-          </p:cNvSpPr>
-          <p:nvPr>
-            <p:ph idx="11" sz="quarter" type="ftr"/>
-          </p:nvPr>
-        </p:nvSpPr>
-        <p:spPr/>
-        <p:txBody>
-          <a:bodyPr/>
-          <a:lstStyle/>
-          <a:p>
-            <a:endParaRPr lang="en-US"/>
-          </a:p>
-        </p:txBody>
-      </p:sp>
-    </p:spTree>
-  </p:cSld>
-</p:sld>
-</file>
-
-<file path=ppt/slides/slide5.xml><?xml version="1.0" encoding="utf-8"?>
-<p:sld xmlns:a="http://schemas.openxmlformats.org/drawingml/2006/main" xmlns:r="http://schemas.openxmlformats.org/officeDocument/2006/relationships" xmlns:p="http://schemas.openxmlformats.org/presentationml/2006/main">
-  <p:cSld>
-    <p:spTree>
-      <p:nvGrpSpPr>
-        <p:cNvPr id="1" name=""/>
-        <p:cNvGrpSpPr/>
-        <p:nvPr/>
-      </p:nvGrpSpPr>
-      <p:grpSpPr>
-        <a:xfrm>
-          <a:off x="0" y="0"/>
-          <a:ext cx="0" cy="0"/>
-          <a:chOff x="0" y="0"/>
-          <a:chExt cx="0" cy="0"/>
-        </a:xfrm>
-      </p:grpSpPr>
-      <p:sp>
-        <p:nvSpPr>
-          <p:cNvPr id="2" name="Title 1"/>
-          <p:cNvSpPr>
-            <a:spLocks noGrp="1"/>
-          </p:cNvSpPr>
-          <p:nvPr>
-            <p:ph type="title"/>
-          </p:nvPr>
-        </p:nvSpPr>
         <p:spPr>
           <a:xfrm>
             <a:off x="3851920" y="2704935"/>
@@ -6213,7 +6627,7 @@
 </p:sld>
 </file>
 
-<file path=ppt/slides/slide6.xml><?xml version="1.0" encoding="utf-8"?>
+<file path=ppt/slides/slide12.xml><?xml version="1.0" encoding="utf-8"?>
 <p:sld xmlns:a="http://schemas.openxmlformats.org/drawingml/2006/main" xmlns:r="http://schemas.openxmlformats.org/officeDocument/2006/relationships" xmlns:p="http://schemas.openxmlformats.org/presentationml/2006/main">
   <p:cSld>
     <p:spTree>
@@ -6309,7 +6723,7 @@
 </p:sld>
 </file>
 
-<file path=ppt/slides/slide7.xml><?xml version="1.0" encoding="utf-8"?>
+<file path=ppt/slides/slide13.xml><?xml version="1.0" encoding="utf-8"?>
 <p:sld xmlns:a="http://schemas.openxmlformats.org/drawingml/2006/main" xmlns:r="http://schemas.openxmlformats.org/officeDocument/2006/relationships" xmlns:p="http://schemas.openxmlformats.org/presentationml/2006/main">
   <p:cSld>
     <p:spTree>
@@ -6351,7 +6765,7 @@
             </a:pPr>
             <a:r>
               <a:rPr/>
-              <a:t>Results</a:t>
+              <a:t>Boxplot</a:t>
             </a:r>
           </a:p>
         </p:txBody>
@@ -6411,6 +6825,1152 @@
           </a:ln>
         </p:spPr>
       </p:pic>
+      <p:sp>
+        <p:nvSpPr>
+          <p:cNvPr id="6" name="Footer Placeholder 5"/>
+          <p:cNvSpPr>
+            <a:spLocks noGrp="1"/>
+          </p:cNvSpPr>
+          <p:nvPr>
+            <p:ph idx="11" sz="quarter" type="ftr"/>
+          </p:nvPr>
+        </p:nvSpPr>
+        <p:spPr/>
+        <p:txBody>
+          <a:bodyPr/>
+          <a:lstStyle/>
+          <a:p>
+            <a:endParaRPr lang="en-US"/>
+          </a:p>
+        </p:txBody>
+      </p:sp>
+    </p:spTree>
+  </p:cSld>
+</p:sld>
+</file>
+
+<file path=ppt/slides/slide14.xml><?xml version="1.0" encoding="utf-8"?>
+<p:sld xmlns:a="http://schemas.openxmlformats.org/drawingml/2006/main" xmlns:r="http://schemas.openxmlformats.org/officeDocument/2006/relationships" xmlns:p="http://schemas.openxmlformats.org/presentationml/2006/main">
+  <p:cSld>
+    <p:spTree>
+      <p:nvGrpSpPr>
+        <p:cNvPr id="1" name=""/>
+        <p:cNvGrpSpPr/>
+        <p:nvPr/>
+      </p:nvGrpSpPr>
+      <p:grpSpPr>
+        <a:xfrm>
+          <a:off x="0" y="0"/>
+          <a:ext cx="0" cy="0"/>
+          <a:chOff x="0" y="0"/>
+          <a:chExt cx="0" cy="0"/>
+        </a:xfrm>
+      </p:grpSpPr>
+      <p:sp>
+        <p:nvSpPr>
+          <p:cNvPr id="11" name="Title 1"/>
+          <p:cNvSpPr>
+            <a:spLocks noGrp="1"/>
+          </p:cNvSpPr>
+          <p:nvPr>
+            <p:ph type="title"/>
+          </p:nvPr>
+        </p:nvSpPr>
+        <p:spPr>
+          <a:xfrm>
+            <a:off x="457200" y="274639"/>
+            <a:ext cx="8229600" cy="569100"/>
+          </a:xfrm>
+        </p:spPr>
+        <p:txBody>
+          <a:bodyPr/>
+          <a:lstStyle/>
+          <a:p>
+            <a:pPr lvl="0" indent="0" marL="0">
+              <a:buNone/>
+            </a:pPr>
+            <a:r>
+              <a:rPr/>
+              <a:t>Bar chart</a:t>
+            </a:r>
+          </a:p>
+        </p:txBody>
+      </p:sp>
+      <p:sp>
+        <p:nvSpPr>
+          <p:cNvPr id="4" name="Text Placeholder 3"/>
+          <p:cNvSpPr>
+            <a:spLocks noGrp="1"/>
+          </p:cNvSpPr>
+          <p:nvPr>
+            <p:ph idx="2" sz="half" type="body"/>
+          </p:nvPr>
+        </p:nvSpPr>
+        <p:spPr/>
+        <p:txBody>
+          <a:bodyPr/>
+          <a:lstStyle/>
+          <a:p>
+            <a:pPr lvl="0" indent="0" marL="0">
+              <a:buNone/>
+            </a:pPr>
+            <a:r>
+              <a:rPr/>
+              <a:t>The iris dataset was used for this demo.</a:t>
+            </a:r>
+          </a:p>
+        </p:txBody>
+      </p:sp>
+      <p:pic>
+        <p:nvPicPr>
+          <p:cNvPr descr="ppt_report_demo_files/figure-pptx/unnamed-chunk-3-1.png" id="0" name="Picture 1"/>
+          <p:cNvPicPr>
+            <a:picLocks noGrp="1" noChangeAspect="1"/>
+          </p:cNvPicPr>
+          <p:nvPr/>
+        </p:nvPicPr>
+        <p:blipFill>
+          <a:blip r:embed="rId2"/>
+          <a:stretch>
+            <a:fillRect/>
+          </a:stretch>
+        </p:blipFill>
+        <p:spPr bwMode="auto">
+          <a:xfrm>
+            <a:off x="3568700" y="1549400"/>
+            <a:ext cx="5105400" cy="2552700"/>
+          </a:xfrm>
+          <a:prstGeom prst="rect">
+            <a:avLst/>
+          </a:prstGeom>
+          <a:noFill/>
+          <a:ln w="9525">
+            <a:noFill/>
+            <a:headEnd/>
+            <a:tailEnd/>
+          </a:ln>
+        </p:spPr>
+      </p:pic>
+      <p:sp>
+        <p:nvSpPr>
+          <p:cNvPr id="6" name="Footer Placeholder 5"/>
+          <p:cNvSpPr>
+            <a:spLocks noGrp="1"/>
+          </p:cNvSpPr>
+          <p:nvPr>
+            <p:ph idx="11" sz="quarter" type="ftr"/>
+          </p:nvPr>
+        </p:nvSpPr>
+        <p:spPr/>
+        <p:txBody>
+          <a:bodyPr/>
+          <a:lstStyle/>
+          <a:p>
+            <a:endParaRPr lang="en-US"/>
+          </a:p>
+        </p:txBody>
+      </p:sp>
+    </p:spTree>
+  </p:cSld>
+</p:sld>
+</file>
+
+<file path=ppt/slides/slide15.xml><?xml version="1.0" encoding="utf-8"?>
+<p:sld xmlns:a="http://schemas.openxmlformats.org/drawingml/2006/main" xmlns:r="http://schemas.openxmlformats.org/officeDocument/2006/relationships" xmlns:p="http://schemas.openxmlformats.org/presentationml/2006/main">
+  <p:cSld>
+    <p:spTree>
+      <p:nvGrpSpPr>
+        <p:cNvPr id="1" name=""/>
+        <p:cNvGrpSpPr/>
+        <p:nvPr/>
+      </p:nvGrpSpPr>
+      <p:grpSpPr>
+        <a:xfrm>
+          <a:off x="0" y="0"/>
+          <a:ext cx="0" cy="0"/>
+          <a:chOff x="0" y="0"/>
+          <a:chExt cx="0" cy="0"/>
+        </a:xfrm>
+      </p:grpSpPr>
+      <p:sp>
+        <p:nvSpPr>
+          <p:cNvPr id="11" name="Title 1"/>
+          <p:cNvSpPr>
+            <a:spLocks noGrp="1"/>
+          </p:cNvSpPr>
+          <p:nvPr>
+            <p:ph type="title"/>
+          </p:nvPr>
+        </p:nvSpPr>
+        <p:spPr>
+          <a:xfrm>
+            <a:off x="457200" y="274639"/>
+            <a:ext cx="8229600" cy="569100"/>
+          </a:xfrm>
+        </p:spPr>
+        <p:txBody>
+          <a:bodyPr/>
+          <a:lstStyle/>
+          <a:p>
+            <a:pPr lvl="0" indent="0" marL="0">
+              <a:buNone/>
+            </a:pPr>
+            <a:r>
+              <a:rPr/>
+              <a:t>Pie chart</a:t>
+            </a:r>
+          </a:p>
+        </p:txBody>
+      </p:sp>
+      <p:sp>
+        <p:nvSpPr>
+          <p:cNvPr id="4" name="Text Placeholder 3"/>
+          <p:cNvSpPr>
+            <a:spLocks noGrp="1"/>
+          </p:cNvSpPr>
+          <p:nvPr>
+            <p:ph idx="2" sz="half" type="body"/>
+          </p:nvPr>
+        </p:nvSpPr>
+        <p:spPr/>
+        <p:txBody>
+          <a:bodyPr/>
+          <a:lstStyle/>
+          <a:p>
+            <a:pPr lvl="0" indent="0" marL="0">
+              <a:buNone/>
+            </a:pPr>
+            <a:r>
+              <a:rPr/>
+              <a:t>The iris dataset was used for this demo.</a:t>
+            </a:r>
+          </a:p>
+        </p:txBody>
+      </p:sp>
+      <p:pic>
+        <p:nvPicPr>
+          <p:cNvPr descr="ppt_report_demo_files/figure-pptx/unnamed-chunk-4-1.png" id="0" name="Picture 1"/>
+          <p:cNvPicPr>
+            <a:picLocks noGrp="1" noChangeAspect="1"/>
+          </p:cNvPicPr>
+          <p:nvPr/>
+        </p:nvPicPr>
+        <p:blipFill>
+          <a:blip r:embed="rId2"/>
+          <a:stretch>
+            <a:fillRect/>
+          </a:stretch>
+        </p:blipFill>
+        <p:spPr bwMode="auto">
+          <a:xfrm>
+            <a:off x="3568700" y="1549400"/>
+            <a:ext cx="5105400" cy="2552700"/>
+          </a:xfrm>
+          <a:prstGeom prst="rect">
+            <a:avLst/>
+          </a:prstGeom>
+          <a:noFill/>
+          <a:ln w="9525">
+            <a:noFill/>
+            <a:headEnd/>
+            <a:tailEnd/>
+          </a:ln>
+        </p:spPr>
+      </p:pic>
+      <p:sp>
+        <p:nvSpPr>
+          <p:cNvPr id="6" name="Footer Placeholder 5"/>
+          <p:cNvSpPr>
+            <a:spLocks noGrp="1"/>
+          </p:cNvSpPr>
+          <p:nvPr>
+            <p:ph idx="11" sz="quarter" type="ftr"/>
+          </p:nvPr>
+        </p:nvSpPr>
+        <p:spPr/>
+        <p:txBody>
+          <a:bodyPr/>
+          <a:lstStyle/>
+          <a:p>
+            <a:endParaRPr lang="en-US"/>
+          </a:p>
+        </p:txBody>
+      </p:sp>
+    </p:spTree>
+  </p:cSld>
+</p:sld>
+</file>
+
+<file path=ppt/slides/slide2.xml><?xml version="1.0" encoding="utf-8"?>
+<p:sld xmlns:a="http://schemas.openxmlformats.org/drawingml/2006/main" xmlns:r="http://schemas.openxmlformats.org/officeDocument/2006/relationships" xmlns:p="http://schemas.openxmlformats.org/presentationml/2006/main">
+  <p:cSld>
+    <p:spTree>
+      <p:nvGrpSpPr>
+        <p:cNvPr id="1" name=""/>
+        <p:cNvGrpSpPr/>
+        <p:nvPr/>
+      </p:nvGrpSpPr>
+      <p:grpSpPr>
+        <a:xfrm>
+          <a:off x="0" y="0"/>
+          <a:ext cx="0" cy="0"/>
+          <a:chOff x="0" y="0"/>
+          <a:chExt cx="0" cy="0"/>
+        </a:xfrm>
+      </p:grpSpPr>
+      <p:sp>
+        <p:nvSpPr>
+          <p:cNvPr id="2" name="Title 1"/>
+          <p:cNvSpPr>
+            <a:spLocks noGrp="1"/>
+          </p:cNvSpPr>
+          <p:nvPr>
+            <p:ph type="title"/>
+          </p:nvPr>
+        </p:nvSpPr>
+        <p:spPr>
+          <a:xfrm>
+            <a:off x="3851920" y="2704935"/>
+            <a:ext cx="4790598" cy="874927"/>
+          </a:xfrm>
+        </p:spPr>
+        <p:txBody>
+          <a:bodyPr/>
+          <a:lstStyle/>
+          <a:p>
+            <a:pPr lvl="0" indent="0" marL="0">
+              <a:buNone/>
+            </a:pPr>
+            <a:r>
+              <a:rPr/>
+              <a:t>Introduction to Quarto</a:t>
+            </a:r>
+          </a:p>
+        </p:txBody>
+      </p:sp>
+    </p:spTree>
+  </p:cSld>
+</p:sld>
+</file>
+
+<file path=ppt/slides/slide3.xml><?xml version="1.0" encoding="utf-8"?>
+<p:sld xmlns:a="http://schemas.openxmlformats.org/drawingml/2006/main" xmlns:r="http://schemas.openxmlformats.org/officeDocument/2006/relationships" xmlns:p="http://schemas.openxmlformats.org/presentationml/2006/main">
+  <p:cSld>
+    <p:spTree>
+      <p:nvGrpSpPr>
+        <p:cNvPr id="1" name=""/>
+        <p:cNvGrpSpPr/>
+        <p:nvPr/>
+      </p:nvGrpSpPr>
+      <p:grpSpPr>
+        <a:xfrm>
+          <a:off x="0" y="0"/>
+          <a:ext cx="0" cy="0"/>
+          <a:chOff x="0" y="0"/>
+          <a:chExt cx="0" cy="0"/>
+        </a:xfrm>
+      </p:grpSpPr>
+      <p:sp>
+        <p:nvSpPr>
+          <p:cNvPr id="2" name="Title 1"/>
+          <p:cNvSpPr>
+            <a:spLocks noGrp="1"/>
+          </p:cNvSpPr>
+          <p:nvPr>
+            <p:ph type="title"/>
+          </p:nvPr>
+        </p:nvSpPr>
+        <p:spPr/>
+        <p:txBody>
+          <a:bodyPr/>
+          <a:lstStyle/>
+          <a:p>
+            <a:pPr lvl="0" indent="0" marL="0">
+              <a:buNone/>
+            </a:pPr>
+            <a:r>
+              <a:rPr/>
+              <a:t>Quarto</a:t>
+            </a:r>
+          </a:p>
+        </p:txBody>
+      </p:sp>
+      <p:sp>
+        <p:nvSpPr>
+          <p:cNvPr id="3" name="Content Placeholder 2"/>
+          <p:cNvSpPr>
+            <a:spLocks noGrp="1"/>
+          </p:cNvSpPr>
+          <p:nvPr>
+            <p:ph idx="1"/>
+          </p:nvPr>
+        </p:nvSpPr>
+        <p:spPr/>
+        <p:txBody>
+          <a:bodyPr/>
+          <a:lstStyle/>
+          <a:p>
+            <a:pPr lvl="0" indent="0" marL="0">
+              <a:buNone/>
+            </a:pPr>
+            <a:r>
+              <a:rPr/>
+              <a:t>Quarto enables you to weave together content and executable code into a finished presentation. To learn more about Quarto presentations see </a:t>
+            </a:r>
+            <a:r>
+              <a:rPr>
+                <a:hlinkClick r:id="rId2"/>
+              </a:rPr>
+              <a:t>https://quarto.org/docs/presentations/</a:t>
+            </a:r>
+            <a:r>
+              <a:rPr/>
+              <a:t>.</a:t>
+            </a:r>
+          </a:p>
+        </p:txBody>
+      </p:sp>
+      <p:sp>
+        <p:nvSpPr>
+          <p:cNvPr id="5" name="Footer Placeholder 4"/>
+          <p:cNvSpPr>
+            <a:spLocks noGrp="1"/>
+          </p:cNvSpPr>
+          <p:nvPr>
+            <p:ph idx="11" sz="quarter" type="ftr"/>
+          </p:nvPr>
+        </p:nvSpPr>
+        <p:spPr/>
+        <p:txBody>
+          <a:bodyPr/>
+          <a:lstStyle/>
+          <a:p>
+            <a:endParaRPr lang="en-US"/>
+          </a:p>
+        </p:txBody>
+      </p:sp>
+    </p:spTree>
+  </p:cSld>
+</p:sld>
+</file>
+
+<file path=ppt/slides/slide4.xml><?xml version="1.0" encoding="utf-8"?>
+<p:sld xmlns:a="http://schemas.openxmlformats.org/drawingml/2006/main" xmlns:r="http://schemas.openxmlformats.org/officeDocument/2006/relationships" xmlns:p="http://schemas.openxmlformats.org/presentationml/2006/main">
+  <p:cSld>
+    <p:spTree>
+      <p:nvGrpSpPr>
+        <p:cNvPr id="1" name=""/>
+        <p:cNvGrpSpPr/>
+        <p:nvPr/>
+      </p:nvGrpSpPr>
+      <p:grpSpPr>
+        <a:xfrm>
+          <a:off x="0" y="0"/>
+          <a:ext cx="0" cy="0"/>
+          <a:chOff x="0" y="0"/>
+          <a:chExt cx="0" cy="0"/>
+        </a:xfrm>
+      </p:grpSpPr>
+      <p:sp>
+        <p:nvSpPr>
+          <p:cNvPr id="2" name="Title 1"/>
+          <p:cNvSpPr>
+            <a:spLocks noGrp="1"/>
+          </p:cNvSpPr>
+          <p:nvPr>
+            <p:ph type="title"/>
+          </p:nvPr>
+        </p:nvSpPr>
+        <p:spPr/>
+        <p:txBody>
+          <a:bodyPr/>
+          <a:lstStyle/>
+          <a:p>
+            <a:pPr lvl="0" indent="0" marL="0">
+              <a:buNone/>
+            </a:pPr>
+            <a:r>
+              <a:rPr/>
+              <a:t>Bullets</a:t>
+            </a:r>
+          </a:p>
+        </p:txBody>
+      </p:sp>
+      <p:sp>
+        <p:nvSpPr>
+          <p:cNvPr id="3" name="Content Placeholder 2"/>
+          <p:cNvSpPr>
+            <a:spLocks noGrp="1"/>
+          </p:cNvSpPr>
+          <p:nvPr>
+            <p:ph idx="1"/>
+          </p:nvPr>
+        </p:nvSpPr>
+        <p:spPr/>
+        <p:txBody>
+          <a:bodyPr/>
+          <a:lstStyle/>
+          <a:p>
+            <a:pPr lvl="0" indent="0" marL="0">
+              <a:buNone/>
+            </a:pPr>
+            <a:r>
+              <a:rPr/>
+              <a:t>When you click the </a:t>
+            </a:r>
+            <a:r>
+              <a:rPr b="1"/>
+              <a:t>Render</a:t>
+            </a:r>
+            <a:r>
+              <a:rPr/>
+              <a:t> button a document will be generated that includes:</a:t>
+            </a:r>
+          </a:p>
+          <a:p>
+            <a:pPr lvl="0"/>
+            <a:r>
+              <a:rPr/>
+              <a:t>Content authored with markdown</a:t>
+            </a:r>
+          </a:p>
+          <a:p>
+            <a:pPr lvl="0"/>
+            <a:r>
+              <a:rPr/>
+              <a:t>Output from executable code</a:t>
+            </a:r>
+          </a:p>
+        </p:txBody>
+      </p:sp>
+      <p:sp>
+        <p:nvSpPr>
+          <p:cNvPr id="5" name="Footer Placeholder 4"/>
+          <p:cNvSpPr>
+            <a:spLocks noGrp="1"/>
+          </p:cNvSpPr>
+          <p:nvPr>
+            <p:ph idx="11" sz="quarter" type="ftr"/>
+          </p:nvPr>
+        </p:nvSpPr>
+        <p:spPr/>
+        <p:txBody>
+          <a:bodyPr/>
+          <a:lstStyle/>
+          <a:p>
+            <a:endParaRPr lang="en-US"/>
+          </a:p>
+        </p:txBody>
+      </p:sp>
+    </p:spTree>
+  </p:cSld>
+</p:sld>
+</file>
+
+<file path=ppt/slides/slide5.xml><?xml version="1.0" encoding="utf-8"?>
+<p:sld xmlns:a="http://schemas.openxmlformats.org/drawingml/2006/main" xmlns:r="http://schemas.openxmlformats.org/officeDocument/2006/relationships" xmlns:p="http://schemas.openxmlformats.org/presentationml/2006/main">
+  <p:cSld>
+    <p:spTree>
+      <p:nvGrpSpPr>
+        <p:cNvPr id="1" name=""/>
+        <p:cNvGrpSpPr/>
+        <p:nvPr/>
+      </p:nvGrpSpPr>
+      <p:grpSpPr>
+        <a:xfrm>
+          <a:off x="0" y="0"/>
+          <a:ext cx="0" cy="0"/>
+          <a:chOff x="0" y="0"/>
+          <a:chExt cx="0" cy="0"/>
+        </a:xfrm>
+      </p:grpSpPr>
+      <p:sp>
+        <p:nvSpPr>
+          <p:cNvPr id="2" name="Title 1"/>
+          <p:cNvSpPr>
+            <a:spLocks noGrp="1"/>
+          </p:cNvSpPr>
+          <p:nvPr>
+            <p:ph type="title"/>
+          </p:nvPr>
+        </p:nvSpPr>
+        <p:spPr>
+          <a:xfrm>
+            <a:off x="3851920" y="2704935"/>
+            <a:ext cx="4790598" cy="874927"/>
+          </a:xfrm>
+        </p:spPr>
+        <p:txBody>
+          <a:bodyPr/>
+          <a:lstStyle/>
+          <a:p>
+            <a:pPr lvl="0" indent="0" marL="0">
+              <a:buNone/>
+            </a:pPr>
+            <a:r>
+              <a:rPr/>
+              <a:t>Classic Layout</a:t>
+            </a:r>
+          </a:p>
+        </p:txBody>
+      </p:sp>
+    </p:spTree>
+  </p:cSld>
+</p:sld>
+</file>
+
+<file path=ppt/slides/slide6.xml><?xml version="1.0" encoding="utf-8"?>
+<p:sld xmlns:a="http://schemas.openxmlformats.org/drawingml/2006/main" xmlns:r="http://schemas.openxmlformats.org/officeDocument/2006/relationships" xmlns:p="http://schemas.openxmlformats.org/presentationml/2006/main">
+  <p:cSld>
+    <p:spTree>
+      <p:nvGrpSpPr>
+        <p:cNvPr id="1" name=""/>
+        <p:cNvGrpSpPr/>
+        <p:nvPr/>
+      </p:nvGrpSpPr>
+      <p:grpSpPr>
+        <a:xfrm>
+          <a:off x="0" y="0"/>
+          <a:ext cx="0" cy="0"/>
+          <a:chOff x="0" y="0"/>
+          <a:chExt cx="0" cy="0"/>
+        </a:xfrm>
+      </p:grpSpPr>
+      <p:sp>
+        <p:nvSpPr>
+          <p:cNvPr id="2" name="Title 1"/>
+          <p:cNvSpPr>
+            <a:spLocks noGrp="1"/>
+          </p:cNvSpPr>
+          <p:nvPr>
+            <p:ph type="title"/>
+          </p:nvPr>
+        </p:nvSpPr>
+        <p:spPr/>
+        <p:txBody>
+          <a:bodyPr/>
+          <a:lstStyle/>
+          <a:p>
+            <a:pPr lvl="0" indent="0" marL="0">
+              <a:buNone/>
+            </a:pPr>
+            <a:r>
+              <a:rPr/>
+              <a:t>Agenda</a:t>
+            </a:r>
+          </a:p>
+        </p:txBody>
+      </p:sp>
+      <p:graphicFrame>
+        <p:nvGraphicFramePr>
+          <p:cNvPr id="6" name="Content Placeholder 5"/>
+          <p:cNvGraphicFramePr>
+            <a:graphicFrameLocks noGrp="1"/>
+          </p:cNvGraphicFramePr>
+          <p:nvPr>
+            <p:ph idx="1"/>
+          </p:nvPr>
+        </p:nvGraphicFramePr>
+        <p:xfrm>
+          <a:off x="457200" y="1193800"/>
+          <a:ext cx="8229600" cy="3390900"/>
+        </p:xfrm>
+        <a:graphic>
+          <a:graphicData uri="http://schemas.openxmlformats.org/drawingml/2006/table">
+            <a:tbl>
+              <a:tblPr firstRow="0" bandRow="1">
+                <a:tableStyleId>{5C22544A-7EE6-4342-B048-85BDC9FD1C3A}</a:tableStyleId>
+              </a:tblPr>
+              <a:tblGrid>
+                <a:gridCol w="8229600"/>
+              </a:tblGrid>
+              <a:tr h="0">
+                <a:tc>
+                  <a:txBody>
+                    <a:bodyPr/>
+                    <a:lstStyle/>
+                    <a:p>
+                      <a:pPr lvl="0" indent="0" marL="0">
+                        <a:buNone/>
+                      </a:pPr>
+                      <a:r>
+                        <a:rPr/>
+                        <a:t>Agenda item #1</a:t>
+                      </a:r>
+                    </a:p>
+                  </a:txBody>
+                </a:tc>
+              </a:tr>
+              <a:tr h="0">
+                <a:tc>
+                  <a:txBody>
+                    <a:bodyPr/>
+                    <a:lstStyle/>
+                    <a:p>
+                      <a:pPr lvl="0" indent="0" marL="0">
+                        <a:buNone/>
+                      </a:pPr>
+                      <a:r>
+                        <a:rPr/>
+                        <a:t>Agenda item #2</a:t>
+                      </a:r>
+                    </a:p>
+                  </a:txBody>
+                </a:tc>
+              </a:tr>
+              <a:tr h="0">
+                <a:tc>
+                  <a:txBody>
+                    <a:bodyPr/>
+                    <a:lstStyle/>
+                    <a:p>
+                      <a:pPr lvl="0" indent="0" marL="0">
+                        <a:buNone/>
+                      </a:pPr>
+                      <a:r>
+                        <a:rPr/>
+                        <a:t>Agenda item #3</a:t>
+                      </a:r>
+                    </a:p>
+                  </a:txBody>
+                </a:tc>
+              </a:tr>
+              <a:tr h="0">
+                <a:tc>
+                  <a:txBody>
+                    <a:bodyPr/>
+                    <a:lstStyle/>
+                    <a:p>
+                      <a:pPr lvl="0" indent="0" marL="0">
+                        <a:buNone/>
+                      </a:pPr>
+                      <a:r>
+                        <a:rPr/>
+                        <a:t>Agenda item #4</a:t>
+                      </a:r>
+                    </a:p>
+                  </a:txBody>
+                </a:tc>
+              </a:tr>
+              <a:tr h="0">
+                <a:tc>
+                  <a:txBody>
+                    <a:bodyPr/>
+                    <a:lstStyle/>
+                    <a:p>
+                      <a:pPr lvl="0" indent="0" marL="0">
+                        <a:buNone/>
+                      </a:pPr>
+                      <a:r>
+                        <a:rPr/>
+                        <a:t>Agenda item #5</a:t>
+                      </a:r>
+                    </a:p>
+                  </a:txBody>
+                </a:tc>
+              </a:tr>
+              <a:tr h="0">
+                <a:tc>
+                  <a:txBody>
+                    <a:bodyPr/>
+                    <a:lstStyle/>
+                    <a:p>
+                      <a:pPr lvl="0" indent="0" marL="0">
+                        <a:buNone/>
+                      </a:pPr>
+                      <a:r>
+                        <a:rPr/>
+                        <a:t>Agenda item #6</a:t>
+                      </a:r>
+                    </a:p>
+                  </a:txBody>
+                </a:tc>
+              </a:tr>
+            </a:tbl>
+          </a:graphicData>
+        </a:graphic>
+      </p:graphicFrame>
+      <p:sp>
+        <p:nvSpPr>
+          <p:cNvPr id="5" name="Footer Placeholder 4"/>
+          <p:cNvSpPr>
+            <a:spLocks noGrp="1"/>
+          </p:cNvSpPr>
+          <p:nvPr>
+            <p:ph idx="11" sz="quarter" type="ftr"/>
+          </p:nvPr>
+        </p:nvSpPr>
+        <p:spPr/>
+        <p:txBody>
+          <a:bodyPr/>
+          <a:lstStyle/>
+          <a:p>
+            <a:endParaRPr lang="en-US"/>
+          </a:p>
+        </p:txBody>
+      </p:sp>
+    </p:spTree>
+  </p:cSld>
+</p:sld>
+</file>
+
+<file path=ppt/slides/slide7.xml><?xml version="1.0" encoding="utf-8"?>
+<p:sld xmlns:a="http://schemas.openxmlformats.org/drawingml/2006/main" xmlns:r="http://schemas.openxmlformats.org/officeDocument/2006/relationships" xmlns:p="http://schemas.openxmlformats.org/presentationml/2006/main">
+  <p:cSld>
+    <p:spTree>
+      <p:nvGrpSpPr>
+        <p:cNvPr id="1" name=""/>
+        <p:cNvGrpSpPr/>
+        <p:nvPr/>
+      </p:nvGrpSpPr>
+      <p:grpSpPr>
+        <a:xfrm>
+          <a:off x="0" y="0"/>
+          <a:ext cx="0" cy="0"/>
+          <a:chOff x="0" y="0"/>
+          <a:chExt cx="0" cy="0"/>
+        </a:xfrm>
+      </p:grpSpPr>
+      <p:sp>
+        <p:nvSpPr>
+          <p:cNvPr id="2" name="Title 1"/>
+          <p:cNvSpPr>
+            <a:spLocks noGrp="1"/>
+          </p:cNvSpPr>
+          <p:nvPr>
+            <p:ph type="title"/>
+          </p:nvPr>
+        </p:nvSpPr>
+        <p:spPr/>
+        <p:txBody>
+          <a:bodyPr/>
+          <a:lstStyle/>
+          <a:p>
+            <a:pPr lvl="0" indent="0" marL="0">
+              <a:buNone/>
+            </a:pPr>
+            <a:r>
+              <a:rPr/>
+              <a:t>Title and Text</a:t>
+            </a:r>
+          </a:p>
+        </p:txBody>
+      </p:sp>
+      <p:sp>
+        <p:nvSpPr>
+          <p:cNvPr id="3" name="Content Placeholder 2"/>
+          <p:cNvSpPr>
+            <a:spLocks noGrp="1"/>
+          </p:cNvSpPr>
+          <p:nvPr>
+            <p:ph idx="1"/>
+          </p:nvPr>
+        </p:nvSpPr>
+        <p:spPr/>
+        <p:txBody>
+          <a:bodyPr/>
+          <a:lstStyle/>
+          <a:p>
+            <a:pPr lvl="0" indent="0" marL="0">
+              <a:buNone/>
+            </a:pPr>
+            <a:r>
+              <a:rPr/>
+              <a:t>Title and subtitle should only be one line each.</a:t>
+            </a:r>
+          </a:p>
+          <a:p>
+            <a:pPr lvl="0" indent="0" marL="0">
+              <a:buNone/>
+            </a:pPr>
+            <a:r>
+              <a:rPr/>
+              <a:t>Insert here to highlight the first point you would like to address.</a:t>
+            </a:r>
+          </a:p>
+          <a:p>
+            <a:pPr lvl="0" indent="0" marL="0">
+              <a:buNone/>
+            </a:pPr>
+            <a:r>
+              <a:rPr/>
+              <a:t>Short and sweet is more effective.</a:t>
+            </a:r>
+          </a:p>
+        </p:txBody>
+      </p:sp>
+      <p:sp>
+        <p:nvSpPr>
+          <p:cNvPr id="5" name="Footer Placeholder 4"/>
+          <p:cNvSpPr>
+            <a:spLocks noGrp="1"/>
+          </p:cNvSpPr>
+          <p:nvPr>
+            <p:ph idx="11" sz="quarter" type="ftr"/>
+          </p:nvPr>
+        </p:nvSpPr>
+        <p:spPr/>
+        <p:txBody>
+          <a:bodyPr/>
+          <a:lstStyle/>
+          <a:p>
+            <a:endParaRPr lang="en-US"/>
+          </a:p>
+        </p:txBody>
+      </p:sp>
+    </p:spTree>
+  </p:cSld>
+</p:sld>
+</file>
+
+<file path=ppt/slides/slide8.xml><?xml version="1.0" encoding="utf-8"?>
+<p:sld xmlns:a="http://schemas.openxmlformats.org/drawingml/2006/main" xmlns:r="http://schemas.openxmlformats.org/officeDocument/2006/relationships" xmlns:p="http://schemas.openxmlformats.org/presentationml/2006/main">
+  <p:cSld>
+    <p:spTree>
+      <p:nvGrpSpPr>
+        <p:cNvPr id="1" name=""/>
+        <p:cNvGrpSpPr/>
+        <p:nvPr/>
+      </p:nvGrpSpPr>
+      <p:grpSpPr>
+        <a:xfrm>
+          <a:off x="0" y="0"/>
+          <a:ext cx="0" cy="0"/>
+          <a:chOff x="0" y="0"/>
+          <a:chExt cx="0" cy="0"/>
+        </a:xfrm>
+      </p:grpSpPr>
+      <p:sp>
+        <p:nvSpPr>
+          <p:cNvPr id="2" name="Title 1"/>
+          <p:cNvSpPr>
+            <a:spLocks noGrp="1"/>
+          </p:cNvSpPr>
+          <p:nvPr>
+            <p:ph type="title"/>
+          </p:nvPr>
+        </p:nvSpPr>
+        <p:spPr/>
+        <p:txBody>
+          <a:bodyPr/>
+          <a:lstStyle/>
+          <a:p>
+            <a:pPr lvl="0" indent="0" marL="0">
+              <a:buNone/>
+            </a:pPr>
+            <a:r>
+              <a:rPr/>
+              <a:t>Two Contents</a:t>
+            </a:r>
+          </a:p>
+        </p:txBody>
+      </p:sp>
+      <p:sp>
+        <p:nvSpPr>
+          <p:cNvPr id="3" name="Content Placeholder 2"/>
+          <p:cNvSpPr>
+            <a:spLocks noGrp="1"/>
+          </p:cNvSpPr>
+          <p:nvPr>
+            <p:ph idx="1" sz="half"/>
+          </p:nvPr>
+        </p:nvSpPr>
+        <p:spPr/>
+        <p:txBody>
+          <a:bodyPr/>
+          <a:lstStyle/>
+          <a:p>
+            <a:pPr lvl="0" indent="0" marL="0">
+              <a:buNone/>
+            </a:pPr>
+            <a:r>
+              <a:rPr/>
+              <a:t>Put your content here. Put your content here. Put your content here.</a:t>
+            </a:r>
+          </a:p>
+        </p:txBody>
+      </p:sp>
+      <p:sp>
+        <p:nvSpPr>
+          <p:cNvPr id="4" name="Content Placeholder 3"/>
+          <p:cNvSpPr>
+            <a:spLocks noGrp="1"/>
+          </p:cNvSpPr>
+          <p:nvPr>
+            <p:ph idx="2" sz="half"/>
+          </p:nvPr>
+        </p:nvSpPr>
+        <p:spPr/>
+        <p:txBody>
+          <a:bodyPr/>
+          <a:lstStyle/>
+          <a:p>
+            <a:pPr lvl="0" indent="0" marL="0">
+              <a:buNone/>
+            </a:pPr>
+            <a:r>
+              <a:rPr/>
+              <a:t>Put your content here. Put your content here. Put your content here.</a:t>
+            </a:r>
+          </a:p>
+        </p:txBody>
+      </p:sp>
+      <p:sp>
+        <p:nvSpPr>
+          <p:cNvPr id="6" name="Footer Placeholder 5"/>
+          <p:cNvSpPr>
+            <a:spLocks noGrp="1"/>
+          </p:cNvSpPr>
+          <p:nvPr>
+            <p:ph idx="11" sz="quarter" type="ftr"/>
+          </p:nvPr>
+        </p:nvSpPr>
+        <p:spPr/>
+        <p:txBody>
+          <a:bodyPr/>
+          <a:lstStyle/>
+          <a:p>
+            <a:endParaRPr lang="en-US"/>
+          </a:p>
+        </p:txBody>
+      </p:sp>
+    </p:spTree>
+  </p:cSld>
+</p:sld>
+</file>
+
+<file path=ppt/slides/slide9.xml><?xml version="1.0" encoding="utf-8"?>
+<p:sld xmlns:a="http://schemas.openxmlformats.org/drawingml/2006/main" xmlns:r="http://schemas.openxmlformats.org/officeDocument/2006/relationships" xmlns:p="http://schemas.openxmlformats.org/presentationml/2006/main">
+  <p:cSld>
+    <p:spTree>
+      <p:nvGrpSpPr>
+        <p:cNvPr id="1" name=""/>
+        <p:cNvGrpSpPr/>
+        <p:nvPr/>
+      </p:nvGrpSpPr>
+      <p:grpSpPr>
+        <a:xfrm>
+          <a:off x="0" y="0"/>
+          <a:ext cx="0" cy="0"/>
+          <a:chOff x="0" y="0"/>
+          <a:chExt cx="0" cy="0"/>
+        </a:xfrm>
+      </p:grpSpPr>
+      <p:sp>
+        <p:nvSpPr>
+          <p:cNvPr id="2" name="Title 1"/>
+          <p:cNvSpPr>
+            <a:spLocks noGrp="1"/>
+          </p:cNvSpPr>
+          <p:nvPr>
+            <p:ph type="title"/>
+          </p:nvPr>
+        </p:nvSpPr>
+        <p:spPr/>
+        <p:txBody>
+          <a:bodyPr/>
+          <a:lstStyle/>
+          <a:p>
+            <a:pPr lvl="0" indent="0" marL="0">
+              <a:buNone/>
+            </a:pPr>
+            <a:r>
+              <a:rPr/>
+              <a:t>Text with Image</a:t>
+            </a:r>
+          </a:p>
+        </p:txBody>
+      </p:sp>
+      <p:sp>
+        <p:nvSpPr>
+          <p:cNvPr id="3" name="Content Placeholder 2"/>
+          <p:cNvSpPr>
+            <a:spLocks noGrp="1"/>
+          </p:cNvSpPr>
+          <p:nvPr>
+            <p:ph idx="1" sz="half"/>
+          </p:nvPr>
+        </p:nvSpPr>
+        <p:spPr/>
+        <p:txBody>
+          <a:bodyPr/>
+          <a:lstStyle/>
+          <a:p>
+            <a:pPr lvl="0"/>
+            <a:r>
+              <a:rPr/>
+              <a:t>Insert text here to go along with your photo selection on the right.</a:t>
+            </a:r>
+          </a:p>
+          <a:p>
+            <a:pPr lvl="0"/>
+            <a:r>
+              <a:rPr/>
+              <a:t>Try to keep bullet point content concise, clear, and relating to the subject of the photo.</a:t>
+            </a:r>
+          </a:p>
+        </p:txBody>
+      </p:sp>
+      <p:pic>
+        <p:nvPicPr>
+          <p:cNvPr descr="./images/pptx_example_image1.jpg" id="0" name="Picture 1"/>
+          <p:cNvPicPr>
+            <a:picLocks noGrp="1" noChangeAspect="1"/>
+          </p:cNvPicPr>
+          <p:nvPr/>
+        </p:nvPicPr>
+        <p:blipFill>
+          <a:blip r:embed="rId2"/>
+          <a:stretch>
+            <a:fillRect/>
+          </a:stretch>
+        </p:blipFill>
+        <p:spPr bwMode="auto">
+          <a:xfrm>
+            <a:off x="4711700" y="1193800"/>
+            <a:ext cx="3911600" cy="2882900"/>
+          </a:xfrm>
+          <a:prstGeom prst="rect">
+            <a:avLst/>
+          </a:prstGeom>
+          <a:noFill/>
+          <a:ln w="9525">
+            <a:noFill/>
+            <a:headEnd/>
+            <a:tailEnd/>
+          </a:ln>
+        </p:spPr>
+      </p:pic>
+      <p:sp>
+        <p:nvSpPr>
+          <p:cNvPr id="1" name="TextBox 3"/>
+          <p:cNvSpPr txBox="1"/>
+          <p:nvPr/>
+        </p:nvSpPr>
+        <p:spPr>
+          <a:xfrm>
+            <a:off x="4648200" y="4076700"/>
+            <a:ext cx="4038600" cy="508000"/>
+          </a:xfrm>
+          <a:prstGeom prst="rect">
+            <a:avLst/>
+          </a:prstGeom>
+          <a:noFill/>
+        </p:spPr>
+        <p:txBody>
+          <a:bodyPr/>
+          <a:lstStyle/>
+          <a:p>
+            <a:pPr lvl="0" indent="0" marL="0" algn="ctr">
+              <a:buNone/>
+            </a:pPr>
+            <a:r>
+              <a:rPr/>
+              <a:t>Image1</a:t>
+            </a:r>
+          </a:p>
+        </p:txBody>
+      </p:sp>
       <p:sp>
         <p:nvSpPr>
           <p:cNvPr id="6" name="Footer Placeholder 5"/>
@@ -6766,44 +8326,44 @@
         <a:sysClr val="window" lastClr="FFFFFF"/>
       </a:lt1>
       <a:dk2>
-        <a:srgbClr val="44546A"/>
+        <a:srgbClr val="0E2841"/>
       </a:dk2>
       <a:lt2>
-        <a:srgbClr val="E7E6E6"/>
+        <a:srgbClr val="E8E8E8"/>
       </a:lt2>
       <a:accent1>
-        <a:srgbClr val="5B9BD5"/>
+        <a:srgbClr val="156082"/>
       </a:accent1>
       <a:accent2>
-        <a:srgbClr val="ED7D31"/>
+        <a:srgbClr val="E97132"/>
       </a:accent2>
       <a:accent3>
-        <a:srgbClr val="A5A5A5"/>
+        <a:srgbClr val="196B24"/>
       </a:accent3>
       <a:accent4>
-        <a:srgbClr val="FFC000"/>
+        <a:srgbClr val="0F9ED5"/>
       </a:accent4>
       <a:accent5>
-        <a:srgbClr val="4472C4"/>
+        <a:srgbClr val="A02B93"/>
       </a:accent5>
       <a:accent6>
-        <a:srgbClr val="70AD47"/>
+        <a:srgbClr val="4EA72E"/>
       </a:accent6>
       <a:hlink>
-        <a:srgbClr val="0563C1"/>
+        <a:srgbClr val="467886"/>
       </a:hlink>
       <a:folHlink>
-        <a:srgbClr val="954F72"/>
+        <a:srgbClr val="96607D"/>
       </a:folHlink>
     </a:clrScheme>
     <a:fontScheme name="Office">
       <a:majorFont>
-        <a:latin typeface="Calibri Light" panose="020F0302020204030204"/>
+        <a:latin typeface="Aptos Display" panose="02110004020202020204"/>
         <a:ea typeface=""/>
         <a:cs typeface=""/>
-        <a:font script="Jpan" typeface="ＭＳ Ｐゴシック"/>
+        <a:font script="Jpan" typeface="游ゴシック Light"/>
         <a:font script="Hang" typeface="맑은 고딕"/>
-        <a:font script="Hans" typeface="宋体"/>
+        <a:font script="Hans" typeface="等线 Light"/>
         <a:font script="Hant" typeface="新細明體"/>
         <a:font script="Arab" typeface="Times New Roman"/>
         <a:font script="Hebr" typeface="Times New Roman"/>
@@ -6831,14 +8391,31 @@
         <a:font script="Viet" typeface="Times New Roman"/>
         <a:font script="Uigh" typeface="Microsoft Uighur"/>
         <a:font script="Geor" typeface="Sylfaen"/>
+        <a:font script="Armn" typeface="Arial"/>
+        <a:font script="Bugi" typeface="Leelawadee UI"/>
+        <a:font script="Bopo" typeface="Microsoft JhengHei"/>
+        <a:font script="Java" typeface="Javanese Text"/>
+        <a:font script="Lisu" typeface="Segoe UI"/>
+        <a:font script="Mymr" typeface="Myanmar Text"/>
+        <a:font script="Nkoo" typeface="Ebrima"/>
+        <a:font script="Olck" typeface="Nirmala UI"/>
+        <a:font script="Osma" typeface="Ebrima"/>
+        <a:font script="Phag" typeface="Phagspa"/>
+        <a:font script="Syrn" typeface="Estrangelo Edessa"/>
+        <a:font script="Syrj" typeface="Estrangelo Edessa"/>
+        <a:font script="Syre" typeface="Estrangelo Edessa"/>
+        <a:font script="Sora" typeface="Nirmala UI"/>
+        <a:font script="Tale" typeface="Microsoft Tai Le"/>
+        <a:font script="Talu" typeface="Microsoft New Tai Lue"/>
+        <a:font script="Tfng" typeface="Ebrima"/>
       </a:majorFont>
       <a:minorFont>
-        <a:latin typeface="Calibri" panose="020F0502020204030204"/>
+        <a:latin typeface="Aptos" panose="02110004020202020204"/>
         <a:ea typeface=""/>
         <a:cs typeface=""/>
-        <a:font script="Jpan" typeface="ＭＳ Ｐゴシック"/>
+        <a:font script="Jpan" typeface="游ゴシック"/>
         <a:font script="Hang" typeface="맑은 고딕"/>
-        <a:font script="Hans" typeface="宋体"/>
+        <a:font script="Hans" typeface="等线"/>
         <a:font script="Hant" typeface="新細明體"/>
         <a:font script="Arab" typeface="Arial"/>
         <a:font script="Hebr" typeface="Arial"/>
@@ -6866,6 +8443,23 @@
         <a:font script="Viet" typeface="Arial"/>
         <a:font script="Uigh" typeface="Microsoft Uighur"/>
         <a:font script="Geor" typeface="Sylfaen"/>
+        <a:font script="Armn" typeface="Arial"/>
+        <a:font script="Bugi" typeface="Leelawadee UI"/>
+        <a:font script="Bopo" typeface="Microsoft JhengHei"/>
+        <a:font script="Java" typeface="Javanese Text"/>
+        <a:font script="Lisu" typeface="Segoe UI"/>
+        <a:font script="Mymr" typeface="Myanmar Text"/>
+        <a:font script="Nkoo" typeface="Ebrima"/>
+        <a:font script="Olck" typeface="Nirmala UI"/>
+        <a:font script="Osma" typeface="Ebrima"/>
+        <a:font script="Phag" typeface="Phagspa"/>
+        <a:font script="Syrn" typeface="Estrangelo Edessa"/>
+        <a:font script="Syrj" typeface="Estrangelo Edessa"/>
+        <a:font script="Syre" typeface="Estrangelo Edessa"/>
+        <a:font script="Sora" typeface="Nirmala UI"/>
+        <a:font script="Tale" typeface="Microsoft Tai Le"/>
+        <a:font script="Talu" typeface="Microsoft New Tai Lue"/>
+        <a:font script="Tfng" typeface="Ebrima"/>
       </a:minorFont>
     </a:fontScheme>
     <a:fmtScheme name="Office">
@@ -6927,13 +8521,6 @@
         </a:gradFill>
       </a:fillStyleLst>
       <a:lnStyleLst>
-        <a:ln w="6350" cap="flat" cmpd="sng" algn="ctr">
-          <a:solidFill>
-            <a:schemeClr val="phClr"/>
-          </a:solidFill>
-          <a:prstDash val="solid"/>
-          <a:miter lim="800000"/>
-        </a:ln>
         <a:ln w="12700" cap="flat" cmpd="sng" algn="ctr">
           <a:solidFill>
             <a:schemeClr val="phClr"/>
@@ -6942,6 +8529,13 @@
           <a:miter lim="800000"/>
         </a:ln>
         <a:ln w="19050" cap="flat" cmpd="sng" algn="ctr">
+          <a:solidFill>
+            <a:schemeClr val="phClr"/>
+          </a:solidFill>
+          <a:prstDash val="solid"/>
+          <a:miter lim="800000"/>
+        </a:ln>
+        <a:ln w="25400" cap="flat" cmpd="sng" algn="ctr">
           <a:solidFill>
             <a:schemeClr val="phClr"/>
           </a:solidFill>
@@ -7006,11 +8600,31 @@
       </a:bgFillStyleLst>
     </a:fmtScheme>
   </a:themeElements>
-  <a:objectDefaults/>
+  <a:objectDefaults>
+    <a:lnDef>
+      <a:spPr/>
+      <a:bodyPr/>
+      <a:lstStyle/>
+      <a:style>
+        <a:lnRef idx="2">
+          <a:schemeClr val="accent1"/>
+        </a:lnRef>
+        <a:fillRef idx="0">
+          <a:schemeClr val="accent1"/>
+        </a:fillRef>
+        <a:effectRef idx="1">
+          <a:schemeClr val="accent1"/>
+        </a:effectRef>
+        <a:fontRef idx="minor">
+          <a:schemeClr val="tx1"/>
+        </a:fontRef>
+      </a:style>
+    </a:lnDef>
+  </a:objectDefaults>
   <a:extraClrSchemeLst/>
   <a:extLst>
     <a:ext uri="{05A4C25C-085E-4340-85A3-A5531E510DB2}">
-      <thm15:themeFamily xmlns:thm15="http://schemas.microsoft.com/office/thememl/2012/main" name="Office Theme" id="{62F939B6-93AF-4DB8-9C6B-D6C7DFDC589F}" vid="{4A3C46E8-61CC-4603-A589-7422A47A8E4A}"/>
+      <thm15:themeFamily xmlns:thm15="http://schemas.microsoft.com/office/thememl/2012/main" name="Office Theme" id="{2E142A2C-CD16-42D6-873A-C26D2A0506FA}" vid="{1BDDFF52-6CD6-40A5-AB3C-68EB2F1E4D0A}"/>
     </a:ext>
   </a:extLst>
 </a:theme>

</xml_diff>